<commit_message>
data_mover 수정중 - line buf 구현해야함
</commit_message>
<xml_diff>
--- a/docs/Structure.pptx
+++ b/docs/Structure.pptx
@@ -8,9 +8,12 @@
     <p:sldId id="256" r:id="rId2"/>
     <p:sldId id="257" r:id="rId3"/>
     <p:sldId id="258" r:id="rId4"/>
+    <p:sldId id="261" r:id="rId5"/>
+    <p:sldId id="259" r:id="rId6"/>
+    <p:sldId id="260" r:id="rId7"/>
   </p:sldIdLst>
   <p:sldSz cx="12192000" cy="6858000"/>
-  <p:notesSz cx="6858000" cy="9144000"/>
+  <p:notesSz cx="6786563" cy="9923463"/>
   <p:defaultTextStyle>
     <a:defPPr>
       <a:defRPr lang="ko-KR"/>
@@ -106,6 +109,11 @@
       </a:defRPr>
     </a:lvl9pPr>
   </p:defaultTextStyle>
+  <p:extLst>
+    <p:ext uri="{EFAFB233-063F-42B5-8137-9DF3F51BA10A}">
+      <p15:sldGuideLst xmlns:p15="http://schemas.microsoft.com/office/powerpoint/2012/main"/>
+    </p:ext>
+  </p:extLst>
 </p:presentation>
 </file>
 
@@ -256,7 +264,7 @@
           <a:p>
             <a:fld id="{C645D50E-E351-4030-A478-5B878EF32C92}" type="datetimeFigureOut">
               <a:rPr lang="ko-KR" altLang="en-US" smtClean="0"/>
-              <a:t>2025-06-27 Fri</a:t>
+              <a:t>2025-07-14 Mon</a:t>
             </a:fld>
             <a:endParaRPr lang="ko-KR" altLang="en-US"/>
           </a:p>
@@ -454,7 +462,7 @@
           <a:p>
             <a:fld id="{C645D50E-E351-4030-A478-5B878EF32C92}" type="datetimeFigureOut">
               <a:rPr lang="ko-KR" altLang="en-US" smtClean="0"/>
-              <a:t>2025-06-27 Fri</a:t>
+              <a:t>2025-07-14 Mon</a:t>
             </a:fld>
             <a:endParaRPr lang="ko-KR" altLang="en-US"/>
           </a:p>
@@ -662,7 +670,7 @@
           <a:p>
             <a:fld id="{C645D50E-E351-4030-A478-5B878EF32C92}" type="datetimeFigureOut">
               <a:rPr lang="ko-KR" altLang="en-US" smtClean="0"/>
-              <a:t>2025-06-27 Fri</a:t>
+              <a:t>2025-07-14 Mon</a:t>
             </a:fld>
             <a:endParaRPr lang="ko-KR" altLang="en-US"/>
           </a:p>
@@ -860,7 +868,7 @@
           <a:p>
             <a:fld id="{C645D50E-E351-4030-A478-5B878EF32C92}" type="datetimeFigureOut">
               <a:rPr lang="ko-KR" altLang="en-US" smtClean="0"/>
-              <a:t>2025-06-27 Fri</a:t>
+              <a:t>2025-07-14 Mon</a:t>
             </a:fld>
             <a:endParaRPr lang="ko-KR" altLang="en-US"/>
           </a:p>
@@ -1135,7 +1143,7 @@
           <a:p>
             <a:fld id="{C645D50E-E351-4030-A478-5B878EF32C92}" type="datetimeFigureOut">
               <a:rPr lang="ko-KR" altLang="en-US" smtClean="0"/>
-              <a:t>2025-06-27 Fri</a:t>
+              <a:t>2025-07-14 Mon</a:t>
             </a:fld>
             <a:endParaRPr lang="ko-KR" altLang="en-US"/>
           </a:p>
@@ -1400,7 +1408,7 @@
           <a:p>
             <a:fld id="{C645D50E-E351-4030-A478-5B878EF32C92}" type="datetimeFigureOut">
               <a:rPr lang="ko-KR" altLang="en-US" smtClean="0"/>
-              <a:t>2025-06-27 Fri</a:t>
+              <a:t>2025-07-14 Mon</a:t>
             </a:fld>
             <a:endParaRPr lang="ko-KR" altLang="en-US"/>
           </a:p>
@@ -1812,7 +1820,7 @@
           <a:p>
             <a:fld id="{C645D50E-E351-4030-A478-5B878EF32C92}" type="datetimeFigureOut">
               <a:rPr lang="ko-KR" altLang="en-US" smtClean="0"/>
-              <a:t>2025-06-27 Fri</a:t>
+              <a:t>2025-07-14 Mon</a:t>
             </a:fld>
             <a:endParaRPr lang="ko-KR" altLang="en-US"/>
           </a:p>
@@ -1953,7 +1961,7 @@
           <a:p>
             <a:fld id="{C645D50E-E351-4030-A478-5B878EF32C92}" type="datetimeFigureOut">
               <a:rPr lang="ko-KR" altLang="en-US" smtClean="0"/>
-              <a:t>2025-06-27 Fri</a:t>
+              <a:t>2025-07-14 Mon</a:t>
             </a:fld>
             <a:endParaRPr lang="ko-KR" altLang="en-US"/>
           </a:p>
@@ -2066,7 +2074,7 @@
           <a:p>
             <a:fld id="{C645D50E-E351-4030-A478-5B878EF32C92}" type="datetimeFigureOut">
               <a:rPr lang="ko-KR" altLang="en-US" smtClean="0"/>
-              <a:t>2025-06-27 Fri</a:t>
+              <a:t>2025-07-14 Mon</a:t>
             </a:fld>
             <a:endParaRPr lang="ko-KR" altLang="en-US"/>
           </a:p>
@@ -2377,7 +2385,7 @@
           <a:p>
             <a:fld id="{C645D50E-E351-4030-A478-5B878EF32C92}" type="datetimeFigureOut">
               <a:rPr lang="ko-KR" altLang="en-US" smtClean="0"/>
-              <a:t>2025-06-27 Fri</a:t>
+              <a:t>2025-07-14 Mon</a:t>
             </a:fld>
             <a:endParaRPr lang="ko-KR" altLang="en-US"/>
           </a:p>
@@ -2665,7 +2673,7 @@
           <a:p>
             <a:fld id="{C645D50E-E351-4030-A478-5B878EF32C92}" type="datetimeFigureOut">
               <a:rPr lang="ko-KR" altLang="en-US" smtClean="0"/>
-              <a:t>2025-06-27 Fri</a:t>
+              <a:t>2025-07-14 Mon</a:t>
             </a:fld>
             <a:endParaRPr lang="ko-KR" altLang="en-US"/>
           </a:p>
@@ -2906,7 +2914,7 @@
           <a:p>
             <a:fld id="{C645D50E-E351-4030-A478-5B878EF32C92}" type="datetimeFigureOut">
               <a:rPr lang="ko-KR" altLang="en-US" smtClean="0"/>
-              <a:t>2025-06-27 Fri</a:t>
+              <a:t>2025-07-14 Mon</a:t>
             </a:fld>
             <a:endParaRPr lang="ko-KR" altLang="en-US"/>
           </a:p>
@@ -7149,10 +7157,3556 @@
           </a:p>
         </p:txBody>
       </p:sp>
+      <p:grpSp>
+        <p:nvGrpSpPr>
+          <p:cNvPr id="17" name="그룹 16">
+            <a:extLst>
+              <a:ext uri="{FF2B5EF4-FFF2-40B4-BE49-F238E27FC236}">
+                <a16:creationId xmlns:a16="http://schemas.microsoft.com/office/drawing/2014/main" id="{85B54433-2AE1-AC2E-DA12-BBC6AB2AAC11}"/>
+              </a:ext>
+            </a:extLst>
+          </p:cNvPr>
+          <p:cNvGrpSpPr/>
+          <p:nvPr/>
+        </p:nvGrpSpPr>
+        <p:grpSpPr>
+          <a:xfrm>
+            <a:off x="3432029" y="1963313"/>
+            <a:ext cx="4736816" cy="2673251"/>
+            <a:chOff x="2726166" y="2360475"/>
+            <a:chExt cx="4736816" cy="2673251"/>
+          </a:xfrm>
+        </p:grpSpPr>
+        <p:sp>
+          <p:nvSpPr>
+            <p:cNvPr id="3" name="사각형: 둥근 모서리 2">
+              <a:extLst>
+                <a:ext uri="{FF2B5EF4-FFF2-40B4-BE49-F238E27FC236}">
+                  <a16:creationId xmlns:a16="http://schemas.microsoft.com/office/drawing/2014/main" id="{D57B1D81-1335-1331-7BE7-FECEA74DD594}"/>
+                </a:ext>
+              </a:extLst>
+            </p:cNvPr>
+            <p:cNvSpPr/>
+            <p:nvPr/>
+          </p:nvSpPr>
+          <p:spPr>
+            <a:xfrm>
+              <a:off x="2726168" y="2498234"/>
+              <a:ext cx="714377" cy="594467"/>
+            </a:xfrm>
+            <a:prstGeom prst="roundRect">
+              <a:avLst/>
+            </a:prstGeom>
+            <a:solidFill>
+              <a:schemeClr val="accent2">
+                <a:lumMod val="20000"/>
+                <a:lumOff val="80000"/>
+              </a:schemeClr>
+            </a:solidFill>
+            <a:ln>
+              <a:solidFill>
+                <a:schemeClr val="accent2">
+                  <a:lumMod val="75000"/>
+                </a:schemeClr>
+              </a:solidFill>
+            </a:ln>
+          </p:spPr>
+          <p:style>
+            <a:lnRef idx="2">
+              <a:schemeClr val="dk1"/>
+            </a:lnRef>
+            <a:fillRef idx="1">
+              <a:schemeClr val="lt1"/>
+            </a:fillRef>
+            <a:effectRef idx="0">
+              <a:schemeClr val="dk1"/>
+            </a:effectRef>
+            <a:fontRef idx="minor">
+              <a:schemeClr val="dk1"/>
+            </a:fontRef>
+          </p:style>
+          <p:txBody>
+            <a:bodyPr rtlCol="0" anchor="ctr"/>
+            <a:lstStyle/>
+            <a:p>
+              <a:pPr algn="ctr"/>
+              <a:r>
+                <a:rPr lang="en-US" altLang="ko-KR" sz="1200" b="1" dirty="0"/>
+                <a:t>BRAM</a:t>
+              </a:r>
+              <a:endParaRPr lang="ko-KR" altLang="en-US" sz="1200" b="1" dirty="0"/>
+            </a:p>
+          </p:txBody>
+        </p:sp>
+        <p:grpSp>
+          <p:nvGrpSpPr>
+            <p:cNvPr id="4" name="그룹 3">
+              <a:extLst>
+                <a:ext uri="{FF2B5EF4-FFF2-40B4-BE49-F238E27FC236}">
+                  <a16:creationId xmlns:a16="http://schemas.microsoft.com/office/drawing/2014/main" id="{1AEFB702-446E-2699-57A9-9ED92D3A02C8}"/>
+                </a:ext>
+              </a:extLst>
+            </p:cNvPr>
+            <p:cNvGrpSpPr/>
+            <p:nvPr/>
+          </p:nvGrpSpPr>
+          <p:grpSpPr>
+            <a:xfrm>
+              <a:off x="5223155" y="2360475"/>
+              <a:ext cx="2239827" cy="1464452"/>
+              <a:chOff x="4761337" y="743039"/>
+              <a:chExt cx="2239827" cy="1464452"/>
+            </a:xfrm>
+          </p:grpSpPr>
+          <p:sp>
+            <p:nvSpPr>
+              <p:cNvPr id="5" name="사각형: 위쪽 모서리의 한쪽은 둥글고 다른 한쪽은 잘림 4">
+                <a:extLst>
+                  <a:ext uri="{FF2B5EF4-FFF2-40B4-BE49-F238E27FC236}">
+                    <a16:creationId xmlns:a16="http://schemas.microsoft.com/office/drawing/2014/main" id="{FC7A18A6-ABD2-B146-F5AE-0CA19008E36E}"/>
+                  </a:ext>
+                </a:extLst>
+              </p:cNvPr>
+              <p:cNvSpPr/>
+              <p:nvPr/>
+            </p:nvSpPr>
+            <p:spPr>
+              <a:xfrm>
+                <a:off x="4784436" y="1058305"/>
+                <a:ext cx="2216728" cy="1149186"/>
+              </a:xfrm>
+              <a:prstGeom prst="snipRoundRect">
+                <a:avLst/>
+              </a:prstGeom>
+              <a:solidFill>
+                <a:schemeClr val="accent2">
+                  <a:lumMod val="20000"/>
+                  <a:lumOff val="80000"/>
+                </a:schemeClr>
+              </a:solidFill>
+              <a:ln>
+                <a:solidFill>
+                  <a:schemeClr val="accent2">
+                    <a:lumMod val="75000"/>
+                  </a:schemeClr>
+                </a:solidFill>
+              </a:ln>
+            </p:spPr>
+            <p:style>
+              <a:lnRef idx="2">
+                <a:schemeClr val="dk1"/>
+              </a:lnRef>
+              <a:fillRef idx="1">
+                <a:schemeClr val="lt1"/>
+              </a:fillRef>
+              <a:effectRef idx="0">
+                <a:schemeClr val="dk1"/>
+              </a:effectRef>
+              <a:fontRef idx="minor">
+                <a:schemeClr val="dk1"/>
+              </a:fontRef>
+            </p:style>
+            <p:txBody>
+              <a:bodyPr rtlCol="0" anchor="ctr"/>
+              <a:lstStyle/>
+              <a:p>
+                <a:pPr algn="ctr"/>
+                <a:endParaRPr lang="ko-KR" altLang="en-US"/>
+              </a:p>
+            </p:txBody>
+          </p:sp>
+          <p:sp>
+            <p:nvSpPr>
+              <p:cNvPr id="6" name="사각형: 둥근 모서리 5">
+                <a:extLst>
+                  <a:ext uri="{FF2B5EF4-FFF2-40B4-BE49-F238E27FC236}">
+                    <a16:creationId xmlns:a16="http://schemas.microsoft.com/office/drawing/2014/main" id="{9A0A990B-A4FE-47FD-42E2-EDD127F52773}"/>
+                  </a:ext>
+                </a:extLst>
+              </p:cNvPr>
+              <p:cNvSpPr/>
+              <p:nvPr/>
+            </p:nvSpPr>
+            <p:spPr>
+              <a:xfrm>
+                <a:off x="4982864" y="1213551"/>
+                <a:ext cx="1415184" cy="612202"/>
+              </a:xfrm>
+              <a:prstGeom prst="roundRect">
+                <a:avLst/>
+              </a:prstGeom>
+              <a:solidFill>
+                <a:schemeClr val="accent2">
+                  <a:lumMod val="20000"/>
+                  <a:lumOff val="80000"/>
+                </a:schemeClr>
+              </a:solidFill>
+              <a:ln>
+                <a:solidFill>
+                  <a:schemeClr val="accent2">
+                    <a:lumMod val="75000"/>
+                  </a:schemeClr>
+                </a:solidFill>
+              </a:ln>
+            </p:spPr>
+            <p:style>
+              <a:lnRef idx="2">
+                <a:schemeClr val="dk1"/>
+              </a:lnRef>
+              <a:fillRef idx="1">
+                <a:schemeClr val="lt1"/>
+              </a:fillRef>
+              <a:effectRef idx="0">
+                <a:schemeClr val="dk1"/>
+              </a:effectRef>
+              <a:fontRef idx="minor">
+                <a:schemeClr val="dk1"/>
+              </a:fontRef>
+            </p:style>
+            <p:txBody>
+              <a:bodyPr rtlCol="0" anchor="ctr"/>
+              <a:lstStyle/>
+              <a:p>
+                <a:pPr algn="ctr"/>
+                <a:r>
+                  <a:rPr lang="en-US" altLang="ko-KR" dirty="0"/>
+                  <a:t>CNN Core</a:t>
+                </a:r>
+                <a:endParaRPr lang="ko-KR" altLang="en-US" dirty="0"/>
+              </a:p>
+            </p:txBody>
+          </p:sp>
+          <p:sp>
+            <p:nvSpPr>
+              <p:cNvPr id="7" name="직사각형 6">
+                <a:extLst>
+                  <a:ext uri="{FF2B5EF4-FFF2-40B4-BE49-F238E27FC236}">
+                    <a16:creationId xmlns:a16="http://schemas.microsoft.com/office/drawing/2014/main" id="{508B5B88-CB44-1B72-B039-04433CC4ADB7}"/>
+                  </a:ext>
+                </a:extLst>
+              </p:cNvPr>
+              <p:cNvSpPr/>
+              <p:nvPr/>
+            </p:nvSpPr>
+            <p:spPr>
+              <a:xfrm>
+                <a:off x="5783676" y="1723177"/>
+                <a:ext cx="812800" cy="314037"/>
+              </a:xfrm>
+              <a:prstGeom prst="rect">
+                <a:avLst/>
+              </a:prstGeom>
+              <a:solidFill>
+                <a:schemeClr val="accent2">
+                  <a:lumMod val="20000"/>
+                  <a:lumOff val="80000"/>
+                </a:schemeClr>
+              </a:solidFill>
+              <a:ln>
+                <a:solidFill>
+                  <a:schemeClr val="accent2">
+                    <a:lumMod val="75000"/>
+                  </a:schemeClr>
+                </a:solidFill>
+              </a:ln>
+            </p:spPr>
+            <p:style>
+              <a:lnRef idx="2">
+                <a:schemeClr val="dk1"/>
+              </a:lnRef>
+              <a:fillRef idx="1">
+                <a:schemeClr val="lt1"/>
+              </a:fillRef>
+              <a:effectRef idx="0">
+                <a:schemeClr val="dk1"/>
+              </a:effectRef>
+              <a:fontRef idx="minor">
+                <a:schemeClr val="dk1"/>
+              </a:fontRef>
+            </p:style>
+            <p:txBody>
+              <a:bodyPr rtlCol="0" anchor="ctr"/>
+              <a:lstStyle/>
+              <a:p>
+                <a:pPr algn="ctr"/>
+                <a:r>
+                  <a:rPr lang="en-US" altLang="ko-KR" sz="1400" b="1" dirty="0"/>
+                  <a:t>Kernel</a:t>
+                </a:r>
+                <a:endParaRPr lang="ko-KR" altLang="en-US" sz="1400" b="1" dirty="0"/>
+              </a:p>
+            </p:txBody>
+          </p:sp>
+          <p:sp>
+            <p:nvSpPr>
+              <p:cNvPr id="8" name="TextBox 7">
+                <a:extLst>
+                  <a:ext uri="{FF2B5EF4-FFF2-40B4-BE49-F238E27FC236}">
+                    <a16:creationId xmlns:a16="http://schemas.microsoft.com/office/drawing/2014/main" id="{62B7812B-78AE-C140-3069-C7926A046F97}"/>
+                  </a:ext>
+                </a:extLst>
+              </p:cNvPr>
+              <p:cNvSpPr txBox="1"/>
+              <p:nvPr/>
+            </p:nvSpPr>
+            <p:spPr>
+              <a:xfrm>
+                <a:off x="4761337" y="743039"/>
+                <a:ext cx="1117601" cy="310492"/>
+              </a:xfrm>
+              <a:prstGeom prst="rect">
+                <a:avLst/>
+              </a:prstGeom>
+              <a:noFill/>
+            </p:spPr>
+            <p:txBody>
+              <a:bodyPr wrap="square" rtlCol="0">
+                <a:spAutoFit/>
+              </a:bodyPr>
+              <a:lstStyle/>
+              <a:p>
+                <a:r>
+                  <a:rPr lang="en-US" altLang="ko-KR" sz="1200" b="1" dirty="0"/>
+                  <a:t>Data Mover</a:t>
+                </a:r>
+                <a:endParaRPr lang="ko-KR" altLang="en-US" sz="1200" b="1" dirty="0"/>
+              </a:p>
+            </p:txBody>
+          </p:sp>
+        </p:grpSp>
+        <p:sp>
+          <p:nvSpPr>
+            <p:cNvPr id="9" name="사각형: 둥근 모서리 8">
+              <a:extLst>
+                <a:ext uri="{FF2B5EF4-FFF2-40B4-BE49-F238E27FC236}">
+                  <a16:creationId xmlns:a16="http://schemas.microsoft.com/office/drawing/2014/main" id="{8BA17493-105E-E257-ED23-73F14C538614}"/>
+                </a:ext>
+              </a:extLst>
+            </p:cNvPr>
+            <p:cNvSpPr/>
+            <p:nvPr/>
+          </p:nvSpPr>
+          <p:spPr>
+            <a:xfrm>
+              <a:off x="2726167" y="3427622"/>
+              <a:ext cx="714377" cy="594467"/>
+            </a:xfrm>
+            <a:prstGeom prst="roundRect">
+              <a:avLst/>
+            </a:prstGeom>
+            <a:solidFill>
+              <a:schemeClr val="accent2">
+                <a:lumMod val="20000"/>
+                <a:lumOff val="80000"/>
+              </a:schemeClr>
+            </a:solidFill>
+            <a:ln>
+              <a:solidFill>
+                <a:schemeClr val="accent2">
+                  <a:lumMod val="75000"/>
+                </a:schemeClr>
+              </a:solidFill>
+            </a:ln>
+          </p:spPr>
+          <p:style>
+            <a:lnRef idx="2">
+              <a:schemeClr val="dk1"/>
+            </a:lnRef>
+            <a:fillRef idx="1">
+              <a:schemeClr val="lt1"/>
+            </a:fillRef>
+            <a:effectRef idx="0">
+              <a:schemeClr val="dk1"/>
+            </a:effectRef>
+            <a:fontRef idx="minor">
+              <a:schemeClr val="dk1"/>
+            </a:fontRef>
+          </p:style>
+          <p:txBody>
+            <a:bodyPr rtlCol="0" anchor="ctr"/>
+            <a:lstStyle/>
+            <a:p>
+              <a:pPr algn="ctr"/>
+              <a:r>
+                <a:rPr lang="en-US" altLang="ko-KR" sz="1200" b="1" dirty="0"/>
+                <a:t>BRAM</a:t>
+              </a:r>
+              <a:endParaRPr lang="ko-KR" altLang="en-US" sz="1200" b="1" dirty="0"/>
+            </a:p>
+          </p:txBody>
+        </p:sp>
+        <p:sp>
+          <p:nvSpPr>
+            <p:cNvPr id="10" name="사각형: 둥근 모서리 9">
+              <a:extLst>
+                <a:ext uri="{FF2B5EF4-FFF2-40B4-BE49-F238E27FC236}">
+                  <a16:creationId xmlns:a16="http://schemas.microsoft.com/office/drawing/2014/main" id="{D135DB32-5441-5132-2355-178338A83FA7}"/>
+                </a:ext>
+              </a:extLst>
+            </p:cNvPr>
+            <p:cNvSpPr/>
+            <p:nvPr/>
+          </p:nvSpPr>
+          <p:spPr>
+            <a:xfrm>
+              <a:off x="2726166" y="4359281"/>
+              <a:ext cx="714377" cy="594467"/>
+            </a:xfrm>
+            <a:prstGeom prst="roundRect">
+              <a:avLst/>
+            </a:prstGeom>
+            <a:solidFill>
+              <a:schemeClr val="accent2">
+                <a:lumMod val="20000"/>
+                <a:lumOff val="80000"/>
+              </a:schemeClr>
+            </a:solidFill>
+            <a:ln>
+              <a:solidFill>
+                <a:schemeClr val="accent2">
+                  <a:lumMod val="75000"/>
+                </a:schemeClr>
+              </a:solidFill>
+            </a:ln>
+          </p:spPr>
+          <p:style>
+            <a:lnRef idx="2">
+              <a:schemeClr val="dk1"/>
+            </a:lnRef>
+            <a:fillRef idx="1">
+              <a:schemeClr val="lt1"/>
+            </a:fillRef>
+            <a:effectRef idx="0">
+              <a:schemeClr val="dk1"/>
+            </a:effectRef>
+            <a:fontRef idx="minor">
+              <a:schemeClr val="dk1"/>
+            </a:fontRef>
+          </p:style>
+          <p:txBody>
+            <a:bodyPr rtlCol="0" anchor="ctr"/>
+            <a:lstStyle/>
+            <a:p>
+              <a:pPr algn="ctr"/>
+              <a:r>
+                <a:rPr lang="en-US" altLang="ko-KR" sz="1200" b="1" dirty="0"/>
+                <a:t>BRAM</a:t>
+              </a:r>
+              <a:endParaRPr lang="ko-KR" altLang="en-US" sz="1200" b="1" dirty="0"/>
+            </a:p>
+          </p:txBody>
+        </p:sp>
+        <p:sp>
+          <p:nvSpPr>
+            <p:cNvPr id="11" name="자유형: 도형 10">
+              <a:extLst>
+                <a:ext uri="{FF2B5EF4-FFF2-40B4-BE49-F238E27FC236}">
+                  <a16:creationId xmlns:a16="http://schemas.microsoft.com/office/drawing/2014/main" id="{79A31853-7887-0B4F-BC37-C6CD60AC94E1}"/>
+                </a:ext>
+              </a:extLst>
+            </p:cNvPr>
+            <p:cNvSpPr/>
+            <p:nvPr/>
+          </p:nvSpPr>
+          <p:spPr>
+            <a:xfrm>
+              <a:off x="3435928" y="2798618"/>
+              <a:ext cx="1787228" cy="295564"/>
+            </a:xfrm>
+            <a:custGeom>
+              <a:avLst/>
+              <a:gdLst>
+                <a:gd name="connsiteX0" fmla="*/ 0 w 1810327"/>
+                <a:gd name="connsiteY0" fmla="*/ 0 h 295564"/>
+                <a:gd name="connsiteX1" fmla="*/ 849745 w 1810327"/>
+                <a:gd name="connsiteY1" fmla="*/ 0 h 295564"/>
+                <a:gd name="connsiteX2" fmla="*/ 849745 w 1810327"/>
+                <a:gd name="connsiteY2" fmla="*/ 295564 h 295564"/>
+                <a:gd name="connsiteX3" fmla="*/ 1810327 w 1810327"/>
+                <a:gd name="connsiteY3" fmla="*/ 295564 h 295564"/>
+              </a:gdLst>
+              <a:ahLst/>
+              <a:cxnLst>
+                <a:cxn ang="0">
+                  <a:pos x="connsiteX0" y="connsiteY0"/>
+                </a:cxn>
+                <a:cxn ang="0">
+                  <a:pos x="connsiteX1" y="connsiteY1"/>
+                </a:cxn>
+                <a:cxn ang="0">
+                  <a:pos x="connsiteX2" y="connsiteY2"/>
+                </a:cxn>
+                <a:cxn ang="0">
+                  <a:pos x="connsiteX3" y="connsiteY3"/>
+                </a:cxn>
+              </a:cxnLst>
+              <a:rect l="l" t="t" r="r" b="b"/>
+              <a:pathLst>
+                <a:path w="1810327" h="295564">
+                  <a:moveTo>
+                    <a:pt x="0" y="0"/>
+                  </a:moveTo>
+                  <a:lnTo>
+                    <a:pt x="849745" y="0"/>
+                  </a:lnTo>
+                  <a:lnTo>
+                    <a:pt x="849745" y="295564"/>
+                  </a:lnTo>
+                  <a:lnTo>
+                    <a:pt x="1810327" y="295564"/>
+                  </a:lnTo>
+                </a:path>
+              </a:pathLst>
+            </a:custGeom>
+            <a:noFill/>
+            <a:ln>
+              <a:headEnd type="none" w="med" len="med"/>
+              <a:tailEnd type="arrow" w="med" len="med"/>
+            </a:ln>
+          </p:spPr>
+          <p:style>
+            <a:lnRef idx="2">
+              <a:schemeClr val="dk1"/>
+            </a:lnRef>
+            <a:fillRef idx="1">
+              <a:schemeClr val="lt1"/>
+            </a:fillRef>
+            <a:effectRef idx="0">
+              <a:schemeClr val="dk1"/>
+            </a:effectRef>
+            <a:fontRef idx="minor">
+              <a:schemeClr val="dk1"/>
+            </a:fontRef>
+          </p:style>
+          <p:txBody>
+            <a:bodyPr rtlCol="0" anchor="ctr"/>
+            <a:lstStyle/>
+            <a:p>
+              <a:pPr algn="ctr"/>
+              <a:endParaRPr lang="ko-KR" altLang="en-US"/>
+            </a:p>
+          </p:txBody>
+        </p:sp>
+        <p:sp>
+          <p:nvSpPr>
+            <p:cNvPr id="12" name="자유형: 도형 11">
+              <a:extLst>
+                <a:ext uri="{FF2B5EF4-FFF2-40B4-BE49-F238E27FC236}">
+                  <a16:creationId xmlns:a16="http://schemas.microsoft.com/office/drawing/2014/main" id="{246F1CF7-9DF3-1A91-A30A-ACB0758278F9}"/>
+                </a:ext>
+              </a:extLst>
+            </p:cNvPr>
+            <p:cNvSpPr/>
+            <p:nvPr/>
+          </p:nvSpPr>
+          <p:spPr>
+            <a:xfrm>
+              <a:off x="3435927" y="3408218"/>
+              <a:ext cx="1787228" cy="314037"/>
+            </a:xfrm>
+            <a:custGeom>
+              <a:avLst/>
+              <a:gdLst>
+                <a:gd name="connsiteX0" fmla="*/ 0 w 1810328"/>
+                <a:gd name="connsiteY0" fmla="*/ 314037 h 314037"/>
+                <a:gd name="connsiteX1" fmla="*/ 849746 w 1810328"/>
+                <a:gd name="connsiteY1" fmla="*/ 314037 h 314037"/>
+                <a:gd name="connsiteX2" fmla="*/ 849746 w 1810328"/>
+                <a:gd name="connsiteY2" fmla="*/ 0 h 314037"/>
+                <a:gd name="connsiteX3" fmla="*/ 1810328 w 1810328"/>
+                <a:gd name="connsiteY3" fmla="*/ 0 h 314037"/>
+              </a:gdLst>
+              <a:ahLst/>
+              <a:cxnLst>
+                <a:cxn ang="0">
+                  <a:pos x="connsiteX0" y="connsiteY0"/>
+                </a:cxn>
+                <a:cxn ang="0">
+                  <a:pos x="connsiteX1" y="connsiteY1"/>
+                </a:cxn>
+                <a:cxn ang="0">
+                  <a:pos x="connsiteX2" y="connsiteY2"/>
+                </a:cxn>
+                <a:cxn ang="0">
+                  <a:pos x="connsiteX3" y="connsiteY3"/>
+                </a:cxn>
+              </a:cxnLst>
+              <a:rect l="l" t="t" r="r" b="b"/>
+              <a:pathLst>
+                <a:path w="1810328" h="314037">
+                  <a:moveTo>
+                    <a:pt x="0" y="314037"/>
+                  </a:moveTo>
+                  <a:lnTo>
+                    <a:pt x="849746" y="314037"/>
+                  </a:lnTo>
+                  <a:lnTo>
+                    <a:pt x="849746" y="0"/>
+                  </a:lnTo>
+                  <a:lnTo>
+                    <a:pt x="1810328" y="0"/>
+                  </a:lnTo>
+                </a:path>
+              </a:pathLst>
+            </a:custGeom>
+            <a:noFill/>
+            <a:ln>
+              <a:headEnd type="none" w="med" len="med"/>
+              <a:tailEnd type="arrow" w="med" len="med"/>
+            </a:ln>
+          </p:spPr>
+          <p:style>
+            <a:lnRef idx="2">
+              <a:schemeClr val="dk1"/>
+            </a:lnRef>
+            <a:fillRef idx="1">
+              <a:schemeClr val="lt1"/>
+            </a:fillRef>
+            <a:effectRef idx="0">
+              <a:schemeClr val="dk1"/>
+            </a:effectRef>
+            <a:fontRef idx="minor">
+              <a:schemeClr val="dk1"/>
+            </a:fontRef>
+          </p:style>
+          <p:txBody>
+            <a:bodyPr rtlCol="0" anchor="ctr"/>
+            <a:lstStyle/>
+            <a:p>
+              <a:pPr algn="ctr"/>
+              <a:endParaRPr lang="ko-KR" altLang="en-US"/>
+            </a:p>
+          </p:txBody>
+        </p:sp>
+        <p:sp>
+          <p:nvSpPr>
+            <p:cNvPr id="13" name="TextBox 12">
+              <a:extLst>
+                <a:ext uri="{FF2B5EF4-FFF2-40B4-BE49-F238E27FC236}">
+                  <a16:creationId xmlns:a16="http://schemas.microsoft.com/office/drawing/2014/main" id="{1129FABB-6EAC-FFB0-A88A-8A76495AC14A}"/>
+                </a:ext>
+              </a:extLst>
+            </p:cNvPr>
+            <p:cNvSpPr txBox="1"/>
+            <p:nvPr/>
+          </p:nvSpPr>
+          <p:spPr>
+            <a:xfrm>
+              <a:off x="3761500" y="2460700"/>
+              <a:ext cx="1117601" cy="276999"/>
+            </a:xfrm>
+            <a:prstGeom prst="rect">
+              <a:avLst/>
+            </a:prstGeom>
+            <a:noFill/>
+          </p:spPr>
+          <p:txBody>
+            <a:bodyPr wrap="square" rtlCol="0">
+              <a:spAutoFit/>
+            </a:bodyPr>
+            <a:lstStyle/>
+            <a:p>
+              <a:pPr algn="ctr"/>
+              <a:r>
+                <a:rPr lang="en-US" altLang="ko-KR" sz="1200" b="1" dirty="0"/>
+                <a:t>i_fmap</a:t>
+              </a:r>
+              <a:endParaRPr lang="ko-KR" altLang="en-US" sz="1200" b="1" dirty="0"/>
+            </a:p>
+          </p:txBody>
+        </p:sp>
+        <p:sp>
+          <p:nvSpPr>
+            <p:cNvPr id="14" name="TextBox 13">
+              <a:extLst>
+                <a:ext uri="{FF2B5EF4-FFF2-40B4-BE49-F238E27FC236}">
+                  <a16:creationId xmlns:a16="http://schemas.microsoft.com/office/drawing/2014/main" id="{76E368D7-A16E-34C9-123A-51105453CEE0}"/>
+                </a:ext>
+              </a:extLst>
+            </p:cNvPr>
+            <p:cNvSpPr txBox="1"/>
+            <p:nvPr/>
+          </p:nvSpPr>
+          <p:spPr>
+            <a:xfrm>
+              <a:off x="3761499" y="3819471"/>
+              <a:ext cx="1117601" cy="276999"/>
+            </a:xfrm>
+            <a:prstGeom prst="rect">
+              <a:avLst/>
+            </a:prstGeom>
+            <a:noFill/>
+          </p:spPr>
+          <p:txBody>
+            <a:bodyPr wrap="square" rtlCol="0">
+              <a:spAutoFit/>
+            </a:bodyPr>
+            <a:lstStyle/>
+            <a:p>
+              <a:pPr algn="ctr"/>
+              <a:r>
+                <a:rPr lang="en-US" altLang="ko-KR" sz="1200" b="1" dirty="0"/>
+                <a:t>i_weight</a:t>
+              </a:r>
+              <a:endParaRPr lang="ko-KR" altLang="en-US" sz="1200" b="1" dirty="0"/>
+            </a:p>
+          </p:txBody>
+        </p:sp>
+        <p:sp>
+          <p:nvSpPr>
+            <p:cNvPr id="15" name="자유형: 도형 14">
+              <a:extLst>
+                <a:ext uri="{FF2B5EF4-FFF2-40B4-BE49-F238E27FC236}">
+                  <a16:creationId xmlns:a16="http://schemas.microsoft.com/office/drawing/2014/main" id="{E6611CAA-D93C-D300-A2C9-8472C7A77CA5}"/>
+                </a:ext>
+              </a:extLst>
+            </p:cNvPr>
+            <p:cNvSpPr/>
+            <p:nvPr/>
+          </p:nvSpPr>
+          <p:spPr>
+            <a:xfrm>
+              <a:off x="3435927" y="3823855"/>
+              <a:ext cx="2872509" cy="831272"/>
+            </a:xfrm>
+            <a:custGeom>
+              <a:avLst/>
+              <a:gdLst>
+                <a:gd name="connsiteX0" fmla="*/ 0 w 2872509"/>
+                <a:gd name="connsiteY0" fmla="*/ 831272 h 831272"/>
+                <a:gd name="connsiteX1" fmla="*/ 2872509 w 2872509"/>
+                <a:gd name="connsiteY1" fmla="*/ 831272 h 831272"/>
+                <a:gd name="connsiteX2" fmla="*/ 2872509 w 2872509"/>
+                <a:gd name="connsiteY2" fmla="*/ 0 h 831272"/>
+              </a:gdLst>
+              <a:ahLst/>
+              <a:cxnLst>
+                <a:cxn ang="0">
+                  <a:pos x="connsiteX0" y="connsiteY0"/>
+                </a:cxn>
+                <a:cxn ang="0">
+                  <a:pos x="connsiteX1" y="connsiteY1"/>
+                </a:cxn>
+                <a:cxn ang="0">
+                  <a:pos x="connsiteX2" y="connsiteY2"/>
+                </a:cxn>
+              </a:cxnLst>
+              <a:rect l="l" t="t" r="r" b="b"/>
+              <a:pathLst>
+                <a:path w="2872509" h="831272">
+                  <a:moveTo>
+                    <a:pt x="0" y="831272"/>
+                  </a:moveTo>
+                  <a:lnTo>
+                    <a:pt x="2872509" y="831272"/>
+                  </a:lnTo>
+                  <a:lnTo>
+                    <a:pt x="2872509" y="0"/>
+                  </a:lnTo>
+                </a:path>
+              </a:pathLst>
+            </a:custGeom>
+            <a:noFill/>
+            <a:ln>
+              <a:headEnd type="arrow" w="med" len="med"/>
+              <a:tailEnd type="none" w="med" len="med"/>
+            </a:ln>
+          </p:spPr>
+          <p:style>
+            <a:lnRef idx="2">
+              <a:schemeClr val="dk1"/>
+            </a:lnRef>
+            <a:fillRef idx="1">
+              <a:schemeClr val="lt1"/>
+            </a:fillRef>
+            <a:effectRef idx="0">
+              <a:schemeClr val="dk1"/>
+            </a:effectRef>
+            <a:fontRef idx="minor">
+              <a:schemeClr val="dk1"/>
+            </a:fontRef>
+          </p:style>
+          <p:txBody>
+            <a:bodyPr rtlCol="0" anchor="ctr"/>
+            <a:lstStyle/>
+            <a:p>
+              <a:pPr algn="ctr"/>
+              <a:endParaRPr lang="ko-KR" altLang="en-US"/>
+            </a:p>
+          </p:txBody>
+        </p:sp>
+        <p:sp>
+          <p:nvSpPr>
+            <p:cNvPr id="16" name="TextBox 15">
+              <a:extLst>
+                <a:ext uri="{FF2B5EF4-FFF2-40B4-BE49-F238E27FC236}">
+                  <a16:creationId xmlns:a16="http://schemas.microsoft.com/office/drawing/2014/main" id="{833CC713-45E7-2D21-5066-8A9C5CD695D4}"/>
+                </a:ext>
+              </a:extLst>
+            </p:cNvPr>
+            <p:cNvSpPr txBox="1"/>
+            <p:nvPr/>
+          </p:nvSpPr>
+          <p:spPr>
+            <a:xfrm>
+              <a:off x="4329541" y="4756727"/>
+              <a:ext cx="1117601" cy="276999"/>
+            </a:xfrm>
+            <a:prstGeom prst="rect">
+              <a:avLst/>
+            </a:prstGeom>
+            <a:noFill/>
+          </p:spPr>
+          <p:txBody>
+            <a:bodyPr wrap="square" rtlCol="0">
+              <a:spAutoFit/>
+            </a:bodyPr>
+            <a:lstStyle/>
+            <a:p>
+              <a:pPr algn="ctr"/>
+              <a:r>
+                <a:rPr lang="en-US" altLang="ko-KR" sz="1200" b="1" dirty="0"/>
+                <a:t>o_result</a:t>
+              </a:r>
+              <a:endParaRPr lang="ko-KR" altLang="en-US" sz="1200" b="1" dirty="0"/>
+            </a:p>
+          </p:txBody>
+        </p:sp>
+      </p:grpSp>
     </p:spTree>
     <p:extLst>
       <p:ext uri="{BB962C8B-B14F-4D97-AF65-F5344CB8AC3E}">
         <p14:creationId xmlns:p14="http://schemas.microsoft.com/office/powerpoint/2010/main" val="2905742409"/>
+      </p:ext>
+    </p:extLst>
+  </p:cSld>
+  <p:clrMapOvr>
+    <a:masterClrMapping/>
+  </p:clrMapOvr>
+</p:sld>
+</file>
+
+<file path=ppt/slides/slide4.xml><?xml version="1.0" encoding="utf-8"?>
+<p:sld xmlns:a="http://schemas.openxmlformats.org/drawingml/2006/main" xmlns:r="http://schemas.openxmlformats.org/officeDocument/2006/relationships" xmlns:p="http://schemas.openxmlformats.org/presentationml/2006/main">
+  <p:cSld>
+    <p:spTree>
+      <p:nvGrpSpPr>
+        <p:cNvPr id="1" name="">
+          <a:extLst>
+            <a:ext uri="{FF2B5EF4-FFF2-40B4-BE49-F238E27FC236}">
+              <a16:creationId xmlns:a16="http://schemas.microsoft.com/office/drawing/2014/main" id="{D1661219-498F-B4E2-241C-66AD2E87569E}"/>
+            </a:ext>
+          </a:extLst>
+        </p:cNvPr>
+        <p:cNvGrpSpPr/>
+        <p:nvPr/>
+      </p:nvGrpSpPr>
+      <p:grpSpPr>
+        <a:xfrm>
+          <a:off x="0" y="0"/>
+          <a:ext cx="0" cy="0"/>
+          <a:chOff x="0" y="0"/>
+          <a:chExt cx="0" cy="0"/>
+        </a:xfrm>
+      </p:grpSpPr>
+      <p:sp>
+        <p:nvSpPr>
+          <p:cNvPr id="2" name="TextBox 1">
+            <a:extLst>
+              <a:ext uri="{FF2B5EF4-FFF2-40B4-BE49-F238E27FC236}">
+                <a16:creationId xmlns:a16="http://schemas.microsoft.com/office/drawing/2014/main" id="{1C232921-8F17-2B7B-9B0A-EFAA5C41E913}"/>
+              </a:ext>
+            </a:extLst>
+          </p:cNvPr>
+          <p:cNvSpPr txBox="1"/>
+          <p:nvPr/>
+        </p:nvSpPr>
+        <p:spPr>
+          <a:xfrm>
+            <a:off x="406400" y="267855"/>
+            <a:ext cx="2946400" cy="369332"/>
+          </a:xfrm>
+          <a:prstGeom prst="rect">
+            <a:avLst/>
+          </a:prstGeom>
+          <a:noFill/>
+        </p:spPr>
+        <p:txBody>
+          <a:bodyPr wrap="square" rtlCol="0">
+            <a:spAutoFit/>
+          </a:bodyPr>
+          <a:lstStyle/>
+          <a:p>
+            <a:r>
+              <a:rPr lang="en-US" altLang="ko-KR" dirty="0"/>
+              <a:t>1. Accelerator IP Design</a:t>
+            </a:r>
+            <a:endParaRPr lang="ko-KR" altLang="en-US" dirty="0"/>
+          </a:p>
+        </p:txBody>
+      </p:sp>
+      <p:grpSp>
+        <p:nvGrpSpPr>
+          <p:cNvPr id="14" name="그룹 13">
+            <a:extLst>
+              <a:ext uri="{FF2B5EF4-FFF2-40B4-BE49-F238E27FC236}">
+                <a16:creationId xmlns:a16="http://schemas.microsoft.com/office/drawing/2014/main" id="{8B98459E-4490-5C81-B5E3-70AB8B3DD3C6}"/>
+              </a:ext>
+            </a:extLst>
+          </p:cNvPr>
+          <p:cNvGrpSpPr/>
+          <p:nvPr/>
+        </p:nvGrpSpPr>
+        <p:grpSpPr>
+          <a:xfrm>
+            <a:off x="748145" y="1170708"/>
+            <a:ext cx="3546765" cy="2927927"/>
+            <a:chOff x="480290" y="1965036"/>
+            <a:chExt cx="3546765" cy="2927927"/>
+          </a:xfrm>
+        </p:grpSpPr>
+        <p:grpSp>
+          <p:nvGrpSpPr>
+            <p:cNvPr id="5" name="그룹 4">
+              <a:extLst>
+                <a:ext uri="{FF2B5EF4-FFF2-40B4-BE49-F238E27FC236}">
+                  <a16:creationId xmlns:a16="http://schemas.microsoft.com/office/drawing/2014/main" id="{5BCFFF64-38C7-46EB-732E-9D0FB250896E}"/>
+                </a:ext>
+              </a:extLst>
+            </p:cNvPr>
+            <p:cNvGrpSpPr/>
+            <p:nvPr/>
+          </p:nvGrpSpPr>
+          <p:grpSpPr>
+            <a:xfrm>
+              <a:off x="2909454" y="2700562"/>
+              <a:ext cx="1117601" cy="1095584"/>
+              <a:chOff x="1117599" y="1841580"/>
+              <a:chExt cx="1117601" cy="1095584"/>
+            </a:xfrm>
+          </p:grpSpPr>
+          <p:sp>
+            <p:nvSpPr>
+              <p:cNvPr id="3" name="직사각형 2">
+                <a:extLst>
+                  <a:ext uri="{FF2B5EF4-FFF2-40B4-BE49-F238E27FC236}">
+                    <a16:creationId xmlns:a16="http://schemas.microsoft.com/office/drawing/2014/main" id="{412B1246-9188-78DA-DC6D-6EB4C1E16C5B}"/>
+                  </a:ext>
+                </a:extLst>
+              </p:cNvPr>
+              <p:cNvSpPr/>
+              <p:nvPr/>
+            </p:nvSpPr>
+            <p:spPr>
+              <a:xfrm>
+                <a:off x="1265382" y="2207491"/>
+                <a:ext cx="822036" cy="729673"/>
+              </a:xfrm>
+              <a:prstGeom prst="rect">
+                <a:avLst/>
+              </a:prstGeom>
+            </p:spPr>
+            <p:style>
+              <a:lnRef idx="2">
+                <a:schemeClr val="dk1"/>
+              </a:lnRef>
+              <a:fillRef idx="1">
+                <a:schemeClr val="lt1"/>
+              </a:fillRef>
+              <a:effectRef idx="0">
+                <a:schemeClr val="dk1"/>
+              </a:effectRef>
+              <a:fontRef idx="minor">
+                <a:schemeClr val="dk1"/>
+              </a:fontRef>
+            </p:style>
+            <p:txBody>
+              <a:bodyPr rtlCol="0" anchor="ctr"/>
+              <a:lstStyle/>
+              <a:p>
+                <a:pPr algn="ctr"/>
+                <a:r>
+                  <a:rPr lang="en-US" altLang="ko-KR" dirty="0"/>
+                  <a:t>32bit</a:t>
+                </a:r>
+                <a:endParaRPr lang="ko-KR" altLang="en-US" dirty="0"/>
+              </a:p>
+            </p:txBody>
+          </p:sp>
+          <p:sp>
+            <p:nvSpPr>
+              <p:cNvPr id="4" name="TextBox 3">
+                <a:extLst>
+                  <a:ext uri="{FF2B5EF4-FFF2-40B4-BE49-F238E27FC236}">
+                    <a16:creationId xmlns:a16="http://schemas.microsoft.com/office/drawing/2014/main" id="{808F7D1F-31A2-6651-6C3B-D408F6779FA6}"/>
+                  </a:ext>
+                </a:extLst>
+              </p:cNvPr>
+              <p:cNvSpPr txBox="1"/>
+              <p:nvPr/>
+            </p:nvSpPr>
+            <p:spPr>
+              <a:xfrm>
+                <a:off x="1117599" y="1841580"/>
+                <a:ext cx="1117601" cy="276999"/>
+              </a:xfrm>
+              <a:prstGeom prst="rect">
+                <a:avLst/>
+              </a:prstGeom>
+              <a:noFill/>
+            </p:spPr>
+            <p:txBody>
+              <a:bodyPr wrap="square" rtlCol="0">
+                <a:spAutoFit/>
+              </a:bodyPr>
+              <a:lstStyle/>
+              <a:p>
+                <a:pPr algn="ctr"/>
+                <a:r>
+                  <a:rPr lang="en-US" altLang="ko-KR" sz="1200" b="1" dirty="0"/>
+                  <a:t>Fetch</a:t>
+                </a:r>
+                <a:endParaRPr lang="ko-KR" altLang="en-US" sz="1200" b="1" dirty="0"/>
+              </a:p>
+            </p:txBody>
+          </p:sp>
+        </p:grpSp>
+        <p:sp>
+          <p:nvSpPr>
+            <p:cNvPr id="12" name="직사각형 11">
+              <a:extLst>
+                <a:ext uri="{FF2B5EF4-FFF2-40B4-BE49-F238E27FC236}">
+                  <a16:creationId xmlns:a16="http://schemas.microsoft.com/office/drawing/2014/main" id="{D40E9347-13FE-CA7B-38B6-3904755E6316}"/>
+                </a:ext>
+              </a:extLst>
+            </p:cNvPr>
+            <p:cNvSpPr/>
+            <p:nvPr/>
+          </p:nvSpPr>
+          <p:spPr>
+            <a:xfrm>
+              <a:off x="480290" y="1965036"/>
+              <a:ext cx="1570182" cy="2927927"/>
+            </a:xfrm>
+            <a:prstGeom prst="rect">
+              <a:avLst/>
+            </a:prstGeom>
+          </p:spPr>
+          <p:style>
+            <a:lnRef idx="2">
+              <a:schemeClr val="dk1"/>
+            </a:lnRef>
+            <a:fillRef idx="1">
+              <a:schemeClr val="lt1"/>
+            </a:fillRef>
+            <a:effectRef idx="0">
+              <a:schemeClr val="dk1"/>
+            </a:effectRef>
+            <a:fontRef idx="minor">
+              <a:schemeClr val="dk1"/>
+            </a:fontRef>
+          </p:style>
+          <p:txBody>
+            <a:bodyPr rtlCol="0" anchor="ctr"/>
+            <a:lstStyle/>
+            <a:p>
+              <a:pPr algn="ctr"/>
+              <a:r>
+                <a:rPr lang="en-US" altLang="ko-KR" b="1" dirty="0"/>
+                <a:t>Bram</a:t>
+              </a:r>
+              <a:endParaRPr lang="ko-KR" altLang="en-US" b="1" dirty="0"/>
+            </a:p>
+          </p:txBody>
+        </p:sp>
+        <p:sp>
+          <p:nvSpPr>
+            <p:cNvPr id="13" name="화살표: 오른쪽 12">
+              <a:extLst>
+                <a:ext uri="{FF2B5EF4-FFF2-40B4-BE49-F238E27FC236}">
+                  <a16:creationId xmlns:a16="http://schemas.microsoft.com/office/drawing/2014/main" id="{1091F57E-109C-06ED-A8EE-834409907257}"/>
+                </a:ext>
+              </a:extLst>
+            </p:cNvPr>
+            <p:cNvSpPr/>
+            <p:nvPr/>
+          </p:nvSpPr>
+          <p:spPr>
+            <a:xfrm>
+              <a:off x="2325256" y="3275004"/>
+              <a:ext cx="461818" cy="276999"/>
+            </a:xfrm>
+            <a:prstGeom prst="rightArrow">
+              <a:avLst/>
+            </a:prstGeom>
+          </p:spPr>
+          <p:style>
+            <a:lnRef idx="2">
+              <a:schemeClr val="dk1"/>
+            </a:lnRef>
+            <a:fillRef idx="1">
+              <a:schemeClr val="lt1"/>
+            </a:fillRef>
+            <a:effectRef idx="0">
+              <a:schemeClr val="dk1"/>
+            </a:effectRef>
+            <a:fontRef idx="minor">
+              <a:schemeClr val="dk1"/>
+            </a:fontRef>
+          </p:style>
+          <p:txBody>
+            <a:bodyPr rtlCol="0" anchor="ctr"/>
+            <a:lstStyle/>
+            <a:p>
+              <a:pPr algn="ctr"/>
+              <a:endParaRPr lang="ko-KR" altLang="en-US"/>
+            </a:p>
+          </p:txBody>
+        </p:sp>
+      </p:grpSp>
+      <p:graphicFrame>
+        <p:nvGraphicFramePr>
+          <p:cNvPr id="31" name="표 30">
+            <a:extLst>
+              <a:ext uri="{FF2B5EF4-FFF2-40B4-BE49-F238E27FC236}">
+                <a16:creationId xmlns:a16="http://schemas.microsoft.com/office/drawing/2014/main" id="{C4D03526-FF3E-E257-AA67-F4FE74FAA2A6}"/>
+              </a:ext>
+            </a:extLst>
+          </p:cNvPr>
+          <p:cNvGraphicFramePr>
+            <a:graphicFrameLocks noGrp="1"/>
+          </p:cNvGraphicFramePr>
+          <p:nvPr>
+            <p:extLst>
+              <p:ext uri="{D42A27DB-BD31-4B8C-83A1-F6EECF244321}">
+                <p14:modId xmlns:p14="http://schemas.microsoft.com/office/powerpoint/2010/main" val="3568202657"/>
+              </p:ext>
+            </p:extLst>
+          </p:nvPr>
+        </p:nvGraphicFramePr>
+        <p:xfrm>
+          <a:off x="5477159" y="637187"/>
+          <a:ext cx="4100945" cy="370840"/>
+        </p:xfrm>
+        <a:graphic>
+          <a:graphicData uri="http://schemas.openxmlformats.org/drawingml/2006/table">
+            <a:tbl>
+              <a:tblPr firstRow="1" bandRow="1">
+                <a:tableStyleId>{5940675A-B579-460E-94D1-54222C63F5DA}</a:tableStyleId>
+              </a:tblPr>
+              <a:tblGrid>
+                <a:gridCol w="820189">
+                  <a:extLst>
+                    <a:ext uri="{9D8B030D-6E8A-4147-A177-3AD203B41FA5}">
+                      <a16:colId xmlns:a16="http://schemas.microsoft.com/office/drawing/2014/main" val="2970474131"/>
+                    </a:ext>
+                  </a:extLst>
+                </a:gridCol>
+                <a:gridCol w="820189">
+                  <a:extLst>
+                    <a:ext uri="{9D8B030D-6E8A-4147-A177-3AD203B41FA5}">
+                      <a16:colId xmlns:a16="http://schemas.microsoft.com/office/drawing/2014/main" val="1216059753"/>
+                    </a:ext>
+                  </a:extLst>
+                </a:gridCol>
+                <a:gridCol w="820189">
+                  <a:extLst>
+                    <a:ext uri="{9D8B030D-6E8A-4147-A177-3AD203B41FA5}">
+                      <a16:colId xmlns:a16="http://schemas.microsoft.com/office/drawing/2014/main" val="3782513163"/>
+                    </a:ext>
+                  </a:extLst>
+                </a:gridCol>
+                <a:gridCol w="820189">
+                  <a:extLst>
+                    <a:ext uri="{9D8B030D-6E8A-4147-A177-3AD203B41FA5}">
+                      <a16:colId xmlns:a16="http://schemas.microsoft.com/office/drawing/2014/main" val="3222439716"/>
+                    </a:ext>
+                  </a:extLst>
+                </a:gridCol>
+                <a:gridCol w="820189">
+                  <a:extLst>
+                    <a:ext uri="{9D8B030D-6E8A-4147-A177-3AD203B41FA5}">
+                      <a16:colId xmlns:a16="http://schemas.microsoft.com/office/drawing/2014/main" val="540431133"/>
+                    </a:ext>
+                  </a:extLst>
+                </a:gridCol>
+              </a:tblGrid>
+              <a:tr h="370840">
+                <a:tc>
+                  <a:txBody>
+                    <a:bodyPr/>
+                    <a:lstStyle/>
+                    <a:p>
+                      <a:pPr latinLnBrk="1"/>
+                      <a:endParaRPr lang="ko-KR" altLang="en-US" dirty="0"/>
+                    </a:p>
+                  </a:txBody>
+                  <a:tcPr/>
+                </a:tc>
+                <a:tc>
+                  <a:txBody>
+                    <a:bodyPr/>
+                    <a:lstStyle/>
+                    <a:p>
+                      <a:pPr latinLnBrk="1"/>
+                      <a:endParaRPr lang="ko-KR" altLang="en-US"/>
+                    </a:p>
+                  </a:txBody>
+                  <a:tcPr/>
+                </a:tc>
+                <a:tc>
+                  <a:txBody>
+                    <a:bodyPr/>
+                    <a:lstStyle/>
+                    <a:p>
+                      <a:pPr latinLnBrk="1"/>
+                      <a:endParaRPr lang="ko-KR" altLang="en-US"/>
+                    </a:p>
+                  </a:txBody>
+                  <a:tcPr/>
+                </a:tc>
+                <a:tc>
+                  <a:txBody>
+                    <a:bodyPr/>
+                    <a:lstStyle/>
+                    <a:p>
+                      <a:pPr latinLnBrk="1"/>
+                      <a:endParaRPr lang="ko-KR" altLang="en-US"/>
+                    </a:p>
+                  </a:txBody>
+                  <a:tcPr/>
+                </a:tc>
+                <a:tc>
+                  <a:txBody>
+                    <a:bodyPr/>
+                    <a:lstStyle/>
+                    <a:p>
+                      <a:pPr latinLnBrk="1"/>
+                      <a:endParaRPr lang="ko-KR" altLang="en-US" dirty="0"/>
+                    </a:p>
+                  </a:txBody>
+                  <a:tcPr/>
+                </a:tc>
+                <a:extLst>
+                  <a:ext uri="{0D108BD9-81ED-4DB2-BD59-A6C34878D82A}">
+                    <a16:rowId xmlns:a16="http://schemas.microsoft.com/office/drawing/2014/main" val="3588251456"/>
+                  </a:ext>
+                </a:extLst>
+              </a:tr>
+            </a:tbl>
+          </a:graphicData>
+        </a:graphic>
+      </p:graphicFrame>
+      <p:graphicFrame>
+        <p:nvGraphicFramePr>
+          <p:cNvPr id="34" name="표 33">
+            <a:extLst>
+              <a:ext uri="{FF2B5EF4-FFF2-40B4-BE49-F238E27FC236}">
+                <a16:creationId xmlns:a16="http://schemas.microsoft.com/office/drawing/2014/main" id="{8256BC58-3797-C714-2EFA-142DCECBE7B7}"/>
+              </a:ext>
+            </a:extLst>
+          </p:cNvPr>
+          <p:cNvGraphicFramePr>
+            <a:graphicFrameLocks noGrp="1"/>
+          </p:cNvGraphicFramePr>
+          <p:nvPr>
+            <p:extLst>
+              <p:ext uri="{D42A27DB-BD31-4B8C-83A1-F6EECF244321}">
+                <p14:modId xmlns:p14="http://schemas.microsoft.com/office/powerpoint/2010/main" val="1495127121"/>
+              </p:ext>
+            </p:extLst>
+          </p:nvPr>
+        </p:nvGraphicFramePr>
+        <p:xfrm>
+          <a:off x="5477159" y="1430116"/>
+          <a:ext cx="4100945" cy="370840"/>
+        </p:xfrm>
+        <a:graphic>
+          <a:graphicData uri="http://schemas.openxmlformats.org/drawingml/2006/table">
+            <a:tbl>
+              <a:tblPr firstRow="1" bandRow="1">
+                <a:tableStyleId>{5940675A-B579-460E-94D1-54222C63F5DA}</a:tableStyleId>
+              </a:tblPr>
+              <a:tblGrid>
+                <a:gridCol w="820189">
+                  <a:extLst>
+                    <a:ext uri="{9D8B030D-6E8A-4147-A177-3AD203B41FA5}">
+                      <a16:colId xmlns:a16="http://schemas.microsoft.com/office/drawing/2014/main" val="2970474131"/>
+                    </a:ext>
+                  </a:extLst>
+                </a:gridCol>
+                <a:gridCol w="820189">
+                  <a:extLst>
+                    <a:ext uri="{9D8B030D-6E8A-4147-A177-3AD203B41FA5}">
+                      <a16:colId xmlns:a16="http://schemas.microsoft.com/office/drawing/2014/main" val="1216059753"/>
+                    </a:ext>
+                  </a:extLst>
+                </a:gridCol>
+                <a:gridCol w="820189">
+                  <a:extLst>
+                    <a:ext uri="{9D8B030D-6E8A-4147-A177-3AD203B41FA5}">
+                      <a16:colId xmlns:a16="http://schemas.microsoft.com/office/drawing/2014/main" val="3782513163"/>
+                    </a:ext>
+                  </a:extLst>
+                </a:gridCol>
+                <a:gridCol w="820189">
+                  <a:extLst>
+                    <a:ext uri="{9D8B030D-6E8A-4147-A177-3AD203B41FA5}">
+                      <a16:colId xmlns:a16="http://schemas.microsoft.com/office/drawing/2014/main" val="3222439716"/>
+                    </a:ext>
+                  </a:extLst>
+                </a:gridCol>
+                <a:gridCol w="820189">
+                  <a:extLst>
+                    <a:ext uri="{9D8B030D-6E8A-4147-A177-3AD203B41FA5}">
+                      <a16:colId xmlns:a16="http://schemas.microsoft.com/office/drawing/2014/main" val="540431133"/>
+                    </a:ext>
+                  </a:extLst>
+                </a:gridCol>
+              </a:tblGrid>
+              <a:tr h="370840">
+                <a:tc>
+                  <a:txBody>
+                    <a:bodyPr/>
+                    <a:lstStyle/>
+                    <a:p>
+                      <a:pPr latinLnBrk="1"/>
+                      <a:endParaRPr lang="ko-KR" altLang="en-US" dirty="0"/>
+                    </a:p>
+                  </a:txBody>
+                  <a:tcPr/>
+                </a:tc>
+                <a:tc>
+                  <a:txBody>
+                    <a:bodyPr/>
+                    <a:lstStyle/>
+                    <a:p>
+                      <a:pPr latinLnBrk="1"/>
+                      <a:endParaRPr lang="ko-KR" altLang="en-US"/>
+                    </a:p>
+                  </a:txBody>
+                  <a:tcPr/>
+                </a:tc>
+                <a:tc>
+                  <a:txBody>
+                    <a:bodyPr/>
+                    <a:lstStyle/>
+                    <a:p>
+                      <a:pPr latinLnBrk="1"/>
+                      <a:endParaRPr lang="ko-KR" altLang="en-US"/>
+                    </a:p>
+                  </a:txBody>
+                  <a:tcPr/>
+                </a:tc>
+                <a:tc>
+                  <a:txBody>
+                    <a:bodyPr/>
+                    <a:lstStyle/>
+                    <a:p>
+                      <a:pPr latinLnBrk="1"/>
+                      <a:endParaRPr lang="ko-KR" altLang="en-US"/>
+                    </a:p>
+                  </a:txBody>
+                  <a:tcPr/>
+                </a:tc>
+                <a:tc>
+                  <a:txBody>
+                    <a:bodyPr/>
+                    <a:lstStyle/>
+                    <a:p>
+                      <a:pPr latinLnBrk="1"/>
+                      <a:endParaRPr lang="ko-KR" altLang="en-US" dirty="0"/>
+                    </a:p>
+                  </a:txBody>
+                  <a:tcPr/>
+                </a:tc>
+                <a:extLst>
+                  <a:ext uri="{0D108BD9-81ED-4DB2-BD59-A6C34878D82A}">
+                    <a16:rowId xmlns:a16="http://schemas.microsoft.com/office/drawing/2014/main" val="3588251456"/>
+                  </a:ext>
+                </a:extLst>
+              </a:tr>
+            </a:tbl>
+          </a:graphicData>
+        </a:graphic>
+      </p:graphicFrame>
+      <p:graphicFrame>
+        <p:nvGraphicFramePr>
+          <p:cNvPr id="35" name="표 34">
+            <a:extLst>
+              <a:ext uri="{FF2B5EF4-FFF2-40B4-BE49-F238E27FC236}">
+                <a16:creationId xmlns:a16="http://schemas.microsoft.com/office/drawing/2014/main" id="{51ACD2BE-E010-6001-B46E-82F970500B20}"/>
+              </a:ext>
+            </a:extLst>
+          </p:cNvPr>
+          <p:cNvGraphicFramePr>
+            <a:graphicFrameLocks noGrp="1"/>
+          </p:cNvGraphicFramePr>
+          <p:nvPr>
+            <p:extLst>
+              <p:ext uri="{D42A27DB-BD31-4B8C-83A1-F6EECF244321}">
+                <p14:modId xmlns:p14="http://schemas.microsoft.com/office/powerpoint/2010/main" val="363967632"/>
+              </p:ext>
+            </p:extLst>
+          </p:nvPr>
+        </p:nvGraphicFramePr>
+        <p:xfrm>
+          <a:off x="5477157" y="2266893"/>
+          <a:ext cx="4100945" cy="370840"/>
+        </p:xfrm>
+        <a:graphic>
+          <a:graphicData uri="http://schemas.openxmlformats.org/drawingml/2006/table">
+            <a:tbl>
+              <a:tblPr firstRow="1" bandRow="1">
+                <a:tableStyleId>{5940675A-B579-460E-94D1-54222C63F5DA}</a:tableStyleId>
+              </a:tblPr>
+              <a:tblGrid>
+                <a:gridCol w="820189">
+                  <a:extLst>
+                    <a:ext uri="{9D8B030D-6E8A-4147-A177-3AD203B41FA5}">
+                      <a16:colId xmlns:a16="http://schemas.microsoft.com/office/drawing/2014/main" val="2970474131"/>
+                    </a:ext>
+                  </a:extLst>
+                </a:gridCol>
+                <a:gridCol w="820189">
+                  <a:extLst>
+                    <a:ext uri="{9D8B030D-6E8A-4147-A177-3AD203B41FA5}">
+                      <a16:colId xmlns:a16="http://schemas.microsoft.com/office/drawing/2014/main" val="1216059753"/>
+                    </a:ext>
+                  </a:extLst>
+                </a:gridCol>
+                <a:gridCol w="820189">
+                  <a:extLst>
+                    <a:ext uri="{9D8B030D-6E8A-4147-A177-3AD203B41FA5}">
+                      <a16:colId xmlns:a16="http://schemas.microsoft.com/office/drawing/2014/main" val="3782513163"/>
+                    </a:ext>
+                  </a:extLst>
+                </a:gridCol>
+                <a:gridCol w="820189">
+                  <a:extLst>
+                    <a:ext uri="{9D8B030D-6E8A-4147-A177-3AD203B41FA5}">
+                      <a16:colId xmlns:a16="http://schemas.microsoft.com/office/drawing/2014/main" val="3222439716"/>
+                    </a:ext>
+                  </a:extLst>
+                </a:gridCol>
+                <a:gridCol w="820189">
+                  <a:extLst>
+                    <a:ext uri="{9D8B030D-6E8A-4147-A177-3AD203B41FA5}">
+                      <a16:colId xmlns:a16="http://schemas.microsoft.com/office/drawing/2014/main" val="540431133"/>
+                    </a:ext>
+                  </a:extLst>
+                </a:gridCol>
+              </a:tblGrid>
+              <a:tr h="370840">
+                <a:tc>
+                  <a:txBody>
+                    <a:bodyPr/>
+                    <a:lstStyle/>
+                    <a:p>
+                      <a:pPr latinLnBrk="1"/>
+                      <a:endParaRPr lang="ko-KR" altLang="en-US" dirty="0"/>
+                    </a:p>
+                  </a:txBody>
+                  <a:tcPr/>
+                </a:tc>
+                <a:tc>
+                  <a:txBody>
+                    <a:bodyPr/>
+                    <a:lstStyle/>
+                    <a:p>
+                      <a:pPr latinLnBrk="1"/>
+                      <a:endParaRPr lang="ko-KR" altLang="en-US"/>
+                    </a:p>
+                  </a:txBody>
+                  <a:tcPr/>
+                </a:tc>
+                <a:tc>
+                  <a:txBody>
+                    <a:bodyPr/>
+                    <a:lstStyle/>
+                    <a:p>
+                      <a:pPr latinLnBrk="1"/>
+                      <a:endParaRPr lang="ko-KR" altLang="en-US"/>
+                    </a:p>
+                  </a:txBody>
+                  <a:tcPr/>
+                </a:tc>
+                <a:tc>
+                  <a:txBody>
+                    <a:bodyPr/>
+                    <a:lstStyle/>
+                    <a:p>
+                      <a:pPr latinLnBrk="1"/>
+                      <a:endParaRPr lang="ko-KR" altLang="en-US"/>
+                    </a:p>
+                  </a:txBody>
+                  <a:tcPr/>
+                </a:tc>
+                <a:tc>
+                  <a:txBody>
+                    <a:bodyPr/>
+                    <a:lstStyle/>
+                    <a:p>
+                      <a:pPr latinLnBrk="1"/>
+                      <a:endParaRPr lang="ko-KR" altLang="en-US" dirty="0"/>
+                    </a:p>
+                  </a:txBody>
+                  <a:tcPr/>
+                </a:tc>
+                <a:extLst>
+                  <a:ext uri="{0D108BD9-81ED-4DB2-BD59-A6C34878D82A}">
+                    <a16:rowId xmlns:a16="http://schemas.microsoft.com/office/drawing/2014/main" val="3588251456"/>
+                  </a:ext>
+                </a:extLst>
+              </a:tr>
+            </a:tbl>
+          </a:graphicData>
+        </a:graphic>
+      </p:graphicFrame>
+      <p:graphicFrame>
+        <p:nvGraphicFramePr>
+          <p:cNvPr id="36" name="표 35">
+            <a:extLst>
+              <a:ext uri="{FF2B5EF4-FFF2-40B4-BE49-F238E27FC236}">
+                <a16:creationId xmlns:a16="http://schemas.microsoft.com/office/drawing/2014/main" id="{5793038F-8786-9D10-539C-6F44BC343F7A}"/>
+              </a:ext>
+            </a:extLst>
+          </p:cNvPr>
+          <p:cNvGraphicFramePr>
+            <a:graphicFrameLocks noGrp="1"/>
+          </p:cNvGraphicFramePr>
+          <p:nvPr>
+            <p:extLst>
+              <p:ext uri="{D42A27DB-BD31-4B8C-83A1-F6EECF244321}">
+                <p14:modId xmlns:p14="http://schemas.microsoft.com/office/powerpoint/2010/main" val="3188920576"/>
+              </p:ext>
+            </p:extLst>
+          </p:nvPr>
+        </p:nvGraphicFramePr>
+        <p:xfrm>
+          <a:off x="5477158" y="3059822"/>
+          <a:ext cx="4100945" cy="370840"/>
+        </p:xfrm>
+        <a:graphic>
+          <a:graphicData uri="http://schemas.openxmlformats.org/drawingml/2006/table">
+            <a:tbl>
+              <a:tblPr firstRow="1" bandRow="1">
+                <a:tableStyleId>{5940675A-B579-460E-94D1-54222C63F5DA}</a:tableStyleId>
+              </a:tblPr>
+              <a:tblGrid>
+                <a:gridCol w="820189">
+                  <a:extLst>
+                    <a:ext uri="{9D8B030D-6E8A-4147-A177-3AD203B41FA5}">
+                      <a16:colId xmlns:a16="http://schemas.microsoft.com/office/drawing/2014/main" val="2970474131"/>
+                    </a:ext>
+                  </a:extLst>
+                </a:gridCol>
+                <a:gridCol w="820189">
+                  <a:extLst>
+                    <a:ext uri="{9D8B030D-6E8A-4147-A177-3AD203B41FA5}">
+                      <a16:colId xmlns:a16="http://schemas.microsoft.com/office/drawing/2014/main" val="1216059753"/>
+                    </a:ext>
+                  </a:extLst>
+                </a:gridCol>
+                <a:gridCol w="820189">
+                  <a:extLst>
+                    <a:ext uri="{9D8B030D-6E8A-4147-A177-3AD203B41FA5}">
+                      <a16:colId xmlns:a16="http://schemas.microsoft.com/office/drawing/2014/main" val="3782513163"/>
+                    </a:ext>
+                  </a:extLst>
+                </a:gridCol>
+                <a:gridCol w="820189">
+                  <a:extLst>
+                    <a:ext uri="{9D8B030D-6E8A-4147-A177-3AD203B41FA5}">
+                      <a16:colId xmlns:a16="http://schemas.microsoft.com/office/drawing/2014/main" val="3222439716"/>
+                    </a:ext>
+                  </a:extLst>
+                </a:gridCol>
+                <a:gridCol w="820189">
+                  <a:extLst>
+                    <a:ext uri="{9D8B030D-6E8A-4147-A177-3AD203B41FA5}">
+                      <a16:colId xmlns:a16="http://schemas.microsoft.com/office/drawing/2014/main" val="540431133"/>
+                    </a:ext>
+                  </a:extLst>
+                </a:gridCol>
+              </a:tblGrid>
+              <a:tr h="370840">
+                <a:tc>
+                  <a:txBody>
+                    <a:bodyPr/>
+                    <a:lstStyle/>
+                    <a:p>
+                      <a:pPr latinLnBrk="1"/>
+                      <a:endParaRPr lang="ko-KR" altLang="en-US" dirty="0"/>
+                    </a:p>
+                  </a:txBody>
+                  <a:tcPr/>
+                </a:tc>
+                <a:tc>
+                  <a:txBody>
+                    <a:bodyPr/>
+                    <a:lstStyle/>
+                    <a:p>
+                      <a:pPr latinLnBrk="1"/>
+                      <a:endParaRPr lang="ko-KR" altLang="en-US"/>
+                    </a:p>
+                  </a:txBody>
+                  <a:tcPr/>
+                </a:tc>
+                <a:tc>
+                  <a:txBody>
+                    <a:bodyPr/>
+                    <a:lstStyle/>
+                    <a:p>
+                      <a:pPr latinLnBrk="1"/>
+                      <a:endParaRPr lang="ko-KR" altLang="en-US"/>
+                    </a:p>
+                  </a:txBody>
+                  <a:tcPr/>
+                </a:tc>
+                <a:tc>
+                  <a:txBody>
+                    <a:bodyPr/>
+                    <a:lstStyle/>
+                    <a:p>
+                      <a:pPr latinLnBrk="1"/>
+                      <a:endParaRPr lang="ko-KR" altLang="en-US"/>
+                    </a:p>
+                  </a:txBody>
+                  <a:tcPr/>
+                </a:tc>
+                <a:tc>
+                  <a:txBody>
+                    <a:bodyPr/>
+                    <a:lstStyle/>
+                    <a:p>
+                      <a:pPr latinLnBrk="1"/>
+                      <a:endParaRPr lang="ko-KR" altLang="en-US" dirty="0"/>
+                    </a:p>
+                  </a:txBody>
+                  <a:tcPr/>
+                </a:tc>
+                <a:extLst>
+                  <a:ext uri="{0D108BD9-81ED-4DB2-BD59-A6C34878D82A}">
+                    <a16:rowId xmlns:a16="http://schemas.microsoft.com/office/drawing/2014/main" val="3588251456"/>
+                  </a:ext>
+                </a:extLst>
+              </a:tr>
+            </a:tbl>
+          </a:graphicData>
+        </a:graphic>
+      </p:graphicFrame>
+      <p:graphicFrame>
+        <p:nvGraphicFramePr>
+          <p:cNvPr id="37" name="표 36">
+            <a:extLst>
+              <a:ext uri="{FF2B5EF4-FFF2-40B4-BE49-F238E27FC236}">
+                <a16:creationId xmlns:a16="http://schemas.microsoft.com/office/drawing/2014/main" id="{2367F57A-D831-5DA5-1C76-2F02C6141D71}"/>
+              </a:ext>
+            </a:extLst>
+          </p:cNvPr>
+          <p:cNvGraphicFramePr>
+            <a:graphicFrameLocks noGrp="1"/>
+          </p:cNvGraphicFramePr>
+          <p:nvPr>
+            <p:extLst>
+              <p:ext uri="{D42A27DB-BD31-4B8C-83A1-F6EECF244321}">
+                <p14:modId xmlns:p14="http://schemas.microsoft.com/office/powerpoint/2010/main" val="2572354506"/>
+              </p:ext>
+            </p:extLst>
+          </p:nvPr>
+        </p:nvGraphicFramePr>
+        <p:xfrm>
+          <a:off x="5477157" y="3896599"/>
+          <a:ext cx="4100945" cy="370840"/>
+        </p:xfrm>
+        <a:graphic>
+          <a:graphicData uri="http://schemas.openxmlformats.org/drawingml/2006/table">
+            <a:tbl>
+              <a:tblPr firstRow="1" bandRow="1">
+                <a:tableStyleId>{5940675A-B579-460E-94D1-54222C63F5DA}</a:tableStyleId>
+              </a:tblPr>
+              <a:tblGrid>
+                <a:gridCol w="820189">
+                  <a:extLst>
+                    <a:ext uri="{9D8B030D-6E8A-4147-A177-3AD203B41FA5}">
+                      <a16:colId xmlns:a16="http://schemas.microsoft.com/office/drawing/2014/main" val="2970474131"/>
+                    </a:ext>
+                  </a:extLst>
+                </a:gridCol>
+                <a:gridCol w="820189">
+                  <a:extLst>
+                    <a:ext uri="{9D8B030D-6E8A-4147-A177-3AD203B41FA5}">
+                      <a16:colId xmlns:a16="http://schemas.microsoft.com/office/drawing/2014/main" val="1216059753"/>
+                    </a:ext>
+                  </a:extLst>
+                </a:gridCol>
+                <a:gridCol w="820189">
+                  <a:extLst>
+                    <a:ext uri="{9D8B030D-6E8A-4147-A177-3AD203B41FA5}">
+                      <a16:colId xmlns:a16="http://schemas.microsoft.com/office/drawing/2014/main" val="3782513163"/>
+                    </a:ext>
+                  </a:extLst>
+                </a:gridCol>
+                <a:gridCol w="820189">
+                  <a:extLst>
+                    <a:ext uri="{9D8B030D-6E8A-4147-A177-3AD203B41FA5}">
+                      <a16:colId xmlns:a16="http://schemas.microsoft.com/office/drawing/2014/main" val="3222439716"/>
+                    </a:ext>
+                  </a:extLst>
+                </a:gridCol>
+                <a:gridCol w="820189">
+                  <a:extLst>
+                    <a:ext uri="{9D8B030D-6E8A-4147-A177-3AD203B41FA5}">
+                      <a16:colId xmlns:a16="http://schemas.microsoft.com/office/drawing/2014/main" val="540431133"/>
+                    </a:ext>
+                  </a:extLst>
+                </a:gridCol>
+              </a:tblGrid>
+              <a:tr h="370840">
+                <a:tc>
+                  <a:txBody>
+                    <a:bodyPr/>
+                    <a:lstStyle/>
+                    <a:p>
+                      <a:pPr latinLnBrk="1"/>
+                      <a:endParaRPr lang="ko-KR" altLang="en-US" dirty="0"/>
+                    </a:p>
+                  </a:txBody>
+                  <a:tcPr/>
+                </a:tc>
+                <a:tc>
+                  <a:txBody>
+                    <a:bodyPr/>
+                    <a:lstStyle/>
+                    <a:p>
+                      <a:pPr latinLnBrk="1"/>
+                      <a:endParaRPr lang="ko-KR" altLang="en-US"/>
+                    </a:p>
+                  </a:txBody>
+                  <a:tcPr/>
+                </a:tc>
+                <a:tc>
+                  <a:txBody>
+                    <a:bodyPr/>
+                    <a:lstStyle/>
+                    <a:p>
+                      <a:pPr latinLnBrk="1"/>
+                      <a:endParaRPr lang="ko-KR" altLang="en-US"/>
+                    </a:p>
+                  </a:txBody>
+                  <a:tcPr/>
+                </a:tc>
+                <a:tc>
+                  <a:txBody>
+                    <a:bodyPr/>
+                    <a:lstStyle/>
+                    <a:p>
+                      <a:pPr latinLnBrk="1"/>
+                      <a:endParaRPr lang="ko-KR" altLang="en-US"/>
+                    </a:p>
+                  </a:txBody>
+                  <a:tcPr/>
+                </a:tc>
+                <a:tc>
+                  <a:txBody>
+                    <a:bodyPr/>
+                    <a:lstStyle/>
+                    <a:p>
+                      <a:pPr latinLnBrk="1"/>
+                      <a:endParaRPr lang="ko-KR" altLang="en-US" dirty="0"/>
+                    </a:p>
+                  </a:txBody>
+                  <a:tcPr/>
+                </a:tc>
+                <a:extLst>
+                  <a:ext uri="{0D108BD9-81ED-4DB2-BD59-A6C34878D82A}">
+                    <a16:rowId xmlns:a16="http://schemas.microsoft.com/office/drawing/2014/main" val="3588251456"/>
+                  </a:ext>
+                </a:extLst>
+              </a:tr>
+            </a:tbl>
+          </a:graphicData>
+        </a:graphic>
+      </p:graphicFrame>
+      <p:sp>
+        <p:nvSpPr>
+          <p:cNvPr id="39" name="타원 38">
+            <a:extLst>
+              <a:ext uri="{FF2B5EF4-FFF2-40B4-BE49-F238E27FC236}">
+                <a16:creationId xmlns:a16="http://schemas.microsoft.com/office/drawing/2014/main" id="{BAA00F51-4ACF-2F8E-9F69-684A2D7B9AC0}"/>
+              </a:ext>
+            </a:extLst>
+          </p:cNvPr>
+          <p:cNvSpPr/>
+          <p:nvPr/>
+        </p:nvSpPr>
+        <p:spPr>
+          <a:xfrm>
+            <a:off x="9056250" y="707152"/>
+            <a:ext cx="230909" cy="230909"/>
+          </a:xfrm>
+          <a:prstGeom prst="ellipse">
+            <a:avLst/>
+          </a:prstGeom>
+          <a:solidFill>
+            <a:srgbClr val="FEE19A"/>
+          </a:solidFill>
+        </p:spPr>
+        <p:style>
+          <a:lnRef idx="2">
+            <a:schemeClr val="dk1"/>
+          </a:lnRef>
+          <a:fillRef idx="1">
+            <a:schemeClr val="lt1"/>
+          </a:fillRef>
+          <a:effectRef idx="0">
+            <a:schemeClr val="dk1"/>
+          </a:effectRef>
+          <a:fontRef idx="minor">
+            <a:schemeClr val="dk1"/>
+          </a:fontRef>
+        </p:style>
+        <p:txBody>
+          <a:bodyPr rtlCol="0" anchor="ctr"/>
+          <a:lstStyle/>
+          <a:p>
+            <a:pPr algn="ctr"/>
+            <a:endParaRPr lang="ko-KR" altLang="en-US"/>
+          </a:p>
+        </p:txBody>
+      </p:sp>
+      <p:sp>
+        <p:nvSpPr>
+          <p:cNvPr id="40" name="타원 39">
+            <a:extLst>
+              <a:ext uri="{FF2B5EF4-FFF2-40B4-BE49-F238E27FC236}">
+                <a16:creationId xmlns:a16="http://schemas.microsoft.com/office/drawing/2014/main" id="{832F521A-7D2E-A7ED-BD6F-BF12B42D2880}"/>
+              </a:ext>
+            </a:extLst>
+          </p:cNvPr>
+          <p:cNvSpPr/>
+          <p:nvPr/>
+        </p:nvSpPr>
+        <p:spPr>
+          <a:xfrm>
+            <a:off x="9056250" y="1500081"/>
+            <a:ext cx="230909" cy="230909"/>
+          </a:xfrm>
+          <a:prstGeom prst="ellipse">
+            <a:avLst/>
+          </a:prstGeom>
+          <a:solidFill>
+            <a:srgbClr val="FEE19A"/>
+          </a:solidFill>
+        </p:spPr>
+        <p:style>
+          <a:lnRef idx="2">
+            <a:schemeClr val="dk1"/>
+          </a:lnRef>
+          <a:fillRef idx="1">
+            <a:schemeClr val="lt1"/>
+          </a:fillRef>
+          <a:effectRef idx="0">
+            <a:schemeClr val="dk1"/>
+          </a:effectRef>
+          <a:fontRef idx="minor">
+            <a:schemeClr val="dk1"/>
+          </a:fontRef>
+        </p:style>
+        <p:txBody>
+          <a:bodyPr rtlCol="0" anchor="ctr"/>
+          <a:lstStyle/>
+          <a:p>
+            <a:pPr algn="ctr"/>
+            <a:endParaRPr lang="ko-KR" altLang="en-US"/>
+          </a:p>
+        </p:txBody>
+      </p:sp>
+      <p:sp>
+        <p:nvSpPr>
+          <p:cNvPr id="41" name="타원 40">
+            <a:extLst>
+              <a:ext uri="{FF2B5EF4-FFF2-40B4-BE49-F238E27FC236}">
+                <a16:creationId xmlns:a16="http://schemas.microsoft.com/office/drawing/2014/main" id="{277C255D-CF00-EC7C-21FE-E0DF00AC1F5C}"/>
+              </a:ext>
+            </a:extLst>
+          </p:cNvPr>
+          <p:cNvSpPr/>
+          <p:nvPr/>
+        </p:nvSpPr>
+        <p:spPr>
+          <a:xfrm>
+            <a:off x="9056250" y="2336858"/>
+            <a:ext cx="230909" cy="230909"/>
+          </a:xfrm>
+          <a:prstGeom prst="ellipse">
+            <a:avLst/>
+          </a:prstGeom>
+          <a:solidFill>
+            <a:srgbClr val="FEE19A"/>
+          </a:solidFill>
+        </p:spPr>
+        <p:style>
+          <a:lnRef idx="2">
+            <a:schemeClr val="dk1"/>
+          </a:lnRef>
+          <a:fillRef idx="1">
+            <a:schemeClr val="lt1"/>
+          </a:fillRef>
+          <a:effectRef idx="0">
+            <a:schemeClr val="dk1"/>
+          </a:effectRef>
+          <a:fontRef idx="minor">
+            <a:schemeClr val="dk1"/>
+          </a:fontRef>
+        </p:style>
+        <p:txBody>
+          <a:bodyPr rtlCol="0" anchor="ctr"/>
+          <a:lstStyle/>
+          <a:p>
+            <a:pPr algn="ctr"/>
+            <a:endParaRPr lang="ko-KR" altLang="en-US"/>
+          </a:p>
+        </p:txBody>
+      </p:sp>
+      <p:sp>
+        <p:nvSpPr>
+          <p:cNvPr id="42" name="타원 41">
+            <a:extLst>
+              <a:ext uri="{FF2B5EF4-FFF2-40B4-BE49-F238E27FC236}">
+                <a16:creationId xmlns:a16="http://schemas.microsoft.com/office/drawing/2014/main" id="{59653817-7553-1E98-6582-000CA2EFA473}"/>
+              </a:ext>
+            </a:extLst>
+          </p:cNvPr>
+          <p:cNvSpPr/>
+          <p:nvPr/>
+        </p:nvSpPr>
+        <p:spPr>
+          <a:xfrm>
+            <a:off x="9056249" y="3129787"/>
+            <a:ext cx="230909" cy="230909"/>
+          </a:xfrm>
+          <a:prstGeom prst="ellipse">
+            <a:avLst/>
+          </a:prstGeom>
+          <a:solidFill>
+            <a:srgbClr val="FEE19A"/>
+          </a:solidFill>
+        </p:spPr>
+        <p:style>
+          <a:lnRef idx="2">
+            <a:schemeClr val="dk1"/>
+          </a:lnRef>
+          <a:fillRef idx="1">
+            <a:schemeClr val="lt1"/>
+          </a:fillRef>
+          <a:effectRef idx="0">
+            <a:schemeClr val="dk1"/>
+          </a:effectRef>
+          <a:fontRef idx="minor">
+            <a:schemeClr val="dk1"/>
+          </a:fontRef>
+        </p:style>
+        <p:txBody>
+          <a:bodyPr rtlCol="0" anchor="ctr"/>
+          <a:lstStyle/>
+          <a:p>
+            <a:pPr algn="ctr"/>
+            <a:endParaRPr lang="ko-KR" altLang="en-US"/>
+          </a:p>
+        </p:txBody>
+      </p:sp>
+      <p:sp>
+        <p:nvSpPr>
+          <p:cNvPr id="43" name="타원 42">
+            <a:extLst>
+              <a:ext uri="{FF2B5EF4-FFF2-40B4-BE49-F238E27FC236}">
+                <a16:creationId xmlns:a16="http://schemas.microsoft.com/office/drawing/2014/main" id="{922A6C93-F5B8-4655-E042-A47138340F66}"/>
+              </a:ext>
+            </a:extLst>
+          </p:cNvPr>
+          <p:cNvSpPr/>
+          <p:nvPr/>
+        </p:nvSpPr>
+        <p:spPr>
+          <a:xfrm>
+            <a:off x="9056249" y="3966564"/>
+            <a:ext cx="230909" cy="230909"/>
+          </a:xfrm>
+          <a:prstGeom prst="ellipse">
+            <a:avLst/>
+          </a:prstGeom>
+          <a:solidFill>
+            <a:srgbClr val="FF99CC"/>
+          </a:solidFill>
+        </p:spPr>
+        <p:style>
+          <a:lnRef idx="2">
+            <a:schemeClr val="dk1"/>
+          </a:lnRef>
+          <a:fillRef idx="1">
+            <a:schemeClr val="lt1"/>
+          </a:fillRef>
+          <a:effectRef idx="0">
+            <a:schemeClr val="dk1"/>
+          </a:effectRef>
+          <a:fontRef idx="minor">
+            <a:schemeClr val="dk1"/>
+          </a:fontRef>
+        </p:style>
+        <p:txBody>
+          <a:bodyPr rtlCol="0" anchor="ctr"/>
+          <a:lstStyle/>
+          <a:p>
+            <a:pPr algn="ctr"/>
+            <a:endParaRPr lang="ko-KR" altLang="en-US"/>
+          </a:p>
+        </p:txBody>
+      </p:sp>
+      <p:sp>
+        <p:nvSpPr>
+          <p:cNvPr id="44" name="타원 43">
+            <a:extLst>
+              <a:ext uri="{FF2B5EF4-FFF2-40B4-BE49-F238E27FC236}">
+                <a16:creationId xmlns:a16="http://schemas.microsoft.com/office/drawing/2014/main" id="{63402420-1F9E-BEC5-9853-38F6B46737A3}"/>
+              </a:ext>
+            </a:extLst>
+          </p:cNvPr>
+          <p:cNvSpPr/>
+          <p:nvPr/>
+        </p:nvSpPr>
+        <p:spPr>
+          <a:xfrm>
+            <a:off x="8229596" y="707151"/>
+            <a:ext cx="230909" cy="230909"/>
+          </a:xfrm>
+          <a:prstGeom prst="ellipse">
+            <a:avLst/>
+          </a:prstGeom>
+          <a:solidFill>
+            <a:srgbClr val="FF99CC"/>
+          </a:solidFill>
+        </p:spPr>
+        <p:style>
+          <a:lnRef idx="2">
+            <a:schemeClr val="dk1"/>
+          </a:lnRef>
+          <a:fillRef idx="1">
+            <a:schemeClr val="lt1"/>
+          </a:fillRef>
+          <a:effectRef idx="0">
+            <a:schemeClr val="dk1"/>
+          </a:effectRef>
+          <a:fontRef idx="minor">
+            <a:schemeClr val="dk1"/>
+          </a:fontRef>
+        </p:style>
+        <p:txBody>
+          <a:bodyPr rtlCol="0" anchor="ctr"/>
+          <a:lstStyle/>
+          <a:p>
+            <a:pPr algn="ctr"/>
+            <a:endParaRPr lang="ko-KR" altLang="en-US"/>
+          </a:p>
+        </p:txBody>
+      </p:sp>
+      <p:sp>
+        <p:nvSpPr>
+          <p:cNvPr id="45" name="타원 44">
+            <a:extLst>
+              <a:ext uri="{FF2B5EF4-FFF2-40B4-BE49-F238E27FC236}">
+                <a16:creationId xmlns:a16="http://schemas.microsoft.com/office/drawing/2014/main" id="{0CEA65CE-F024-8CA0-00D2-7E03F6629D1C}"/>
+              </a:ext>
+            </a:extLst>
+          </p:cNvPr>
+          <p:cNvSpPr/>
+          <p:nvPr/>
+        </p:nvSpPr>
+        <p:spPr>
+          <a:xfrm>
+            <a:off x="8229596" y="1500081"/>
+            <a:ext cx="230909" cy="230909"/>
+          </a:xfrm>
+          <a:prstGeom prst="ellipse">
+            <a:avLst/>
+          </a:prstGeom>
+          <a:solidFill>
+            <a:srgbClr val="FF99CC"/>
+          </a:solidFill>
+        </p:spPr>
+        <p:style>
+          <a:lnRef idx="2">
+            <a:schemeClr val="dk1"/>
+          </a:lnRef>
+          <a:fillRef idx="1">
+            <a:schemeClr val="lt1"/>
+          </a:fillRef>
+          <a:effectRef idx="0">
+            <a:schemeClr val="dk1"/>
+          </a:effectRef>
+          <a:fontRef idx="minor">
+            <a:schemeClr val="dk1"/>
+          </a:fontRef>
+        </p:style>
+        <p:txBody>
+          <a:bodyPr rtlCol="0" anchor="ctr"/>
+          <a:lstStyle/>
+          <a:p>
+            <a:pPr algn="ctr"/>
+            <a:endParaRPr lang="ko-KR" altLang="en-US"/>
+          </a:p>
+        </p:txBody>
+      </p:sp>
+      <p:sp>
+        <p:nvSpPr>
+          <p:cNvPr id="46" name="타원 45">
+            <a:extLst>
+              <a:ext uri="{FF2B5EF4-FFF2-40B4-BE49-F238E27FC236}">
+                <a16:creationId xmlns:a16="http://schemas.microsoft.com/office/drawing/2014/main" id="{A6DC6703-F795-A7B7-D24A-420F90BB97A3}"/>
+              </a:ext>
+            </a:extLst>
+          </p:cNvPr>
+          <p:cNvSpPr/>
+          <p:nvPr/>
+        </p:nvSpPr>
+        <p:spPr>
+          <a:xfrm>
+            <a:off x="8229595" y="2336857"/>
+            <a:ext cx="230909" cy="230909"/>
+          </a:xfrm>
+          <a:prstGeom prst="ellipse">
+            <a:avLst/>
+          </a:prstGeom>
+          <a:solidFill>
+            <a:srgbClr val="FF99CC"/>
+          </a:solidFill>
+        </p:spPr>
+        <p:style>
+          <a:lnRef idx="2">
+            <a:schemeClr val="dk1"/>
+          </a:lnRef>
+          <a:fillRef idx="1">
+            <a:schemeClr val="lt1"/>
+          </a:fillRef>
+          <a:effectRef idx="0">
+            <a:schemeClr val="dk1"/>
+          </a:effectRef>
+          <a:fontRef idx="minor">
+            <a:schemeClr val="dk1"/>
+          </a:fontRef>
+        </p:style>
+        <p:txBody>
+          <a:bodyPr rtlCol="0" anchor="ctr"/>
+          <a:lstStyle/>
+          <a:p>
+            <a:pPr algn="ctr"/>
+            <a:endParaRPr lang="ko-KR" altLang="en-US"/>
+          </a:p>
+        </p:txBody>
+      </p:sp>
+      <p:sp>
+        <p:nvSpPr>
+          <p:cNvPr id="47" name="타원 46">
+            <a:extLst>
+              <a:ext uri="{FF2B5EF4-FFF2-40B4-BE49-F238E27FC236}">
+                <a16:creationId xmlns:a16="http://schemas.microsoft.com/office/drawing/2014/main" id="{AF573E11-F400-6EBB-383B-23D29D1951C2}"/>
+              </a:ext>
+            </a:extLst>
+          </p:cNvPr>
+          <p:cNvSpPr/>
+          <p:nvPr/>
+        </p:nvSpPr>
+        <p:spPr>
+          <a:xfrm>
+            <a:off x="8229595" y="3129786"/>
+            <a:ext cx="230909" cy="230909"/>
+          </a:xfrm>
+          <a:prstGeom prst="ellipse">
+            <a:avLst/>
+          </a:prstGeom>
+          <a:solidFill>
+            <a:schemeClr val="accent1">
+              <a:lumMod val="20000"/>
+              <a:lumOff val="80000"/>
+            </a:schemeClr>
+          </a:solidFill>
+        </p:spPr>
+        <p:style>
+          <a:lnRef idx="2">
+            <a:schemeClr val="dk1"/>
+          </a:lnRef>
+          <a:fillRef idx="1">
+            <a:schemeClr val="lt1"/>
+          </a:fillRef>
+          <a:effectRef idx="0">
+            <a:schemeClr val="dk1"/>
+          </a:effectRef>
+          <a:fontRef idx="minor">
+            <a:schemeClr val="dk1"/>
+          </a:fontRef>
+        </p:style>
+        <p:txBody>
+          <a:bodyPr rtlCol="0" anchor="ctr"/>
+          <a:lstStyle/>
+          <a:p>
+            <a:pPr algn="ctr"/>
+            <a:endParaRPr lang="ko-KR" altLang="en-US"/>
+          </a:p>
+        </p:txBody>
+      </p:sp>
+      <p:sp>
+        <p:nvSpPr>
+          <p:cNvPr id="48" name="타원 47">
+            <a:extLst>
+              <a:ext uri="{FF2B5EF4-FFF2-40B4-BE49-F238E27FC236}">
+                <a16:creationId xmlns:a16="http://schemas.microsoft.com/office/drawing/2014/main" id="{45B5261C-9DB3-C70B-E1E4-0E5662F5C8E5}"/>
+              </a:ext>
+            </a:extLst>
+          </p:cNvPr>
+          <p:cNvSpPr/>
+          <p:nvPr/>
+        </p:nvSpPr>
+        <p:spPr>
+          <a:xfrm>
+            <a:off x="8229595" y="3966564"/>
+            <a:ext cx="230909" cy="230909"/>
+          </a:xfrm>
+          <a:prstGeom prst="ellipse">
+            <a:avLst/>
+          </a:prstGeom>
+          <a:solidFill>
+            <a:schemeClr val="accent1">
+              <a:lumMod val="20000"/>
+              <a:lumOff val="80000"/>
+            </a:schemeClr>
+          </a:solidFill>
+        </p:spPr>
+        <p:style>
+          <a:lnRef idx="2">
+            <a:schemeClr val="dk1"/>
+          </a:lnRef>
+          <a:fillRef idx="1">
+            <a:schemeClr val="lt1"/>
+          </a:fillRef>
+          <a:effectRef idx="0">
+            <a:schemeClr val="dk1"/>
+          </a:effectRef>
+          <a:fontRef idx="minor">
+            <a:schemeClr val="dk1"/>
+          </a:fontRef>
+        </p:style>
+        <p:txBody>
+          <a:bodyPr rtlCol="0" anchor="ctr"/>
+          <a:lstStyle/>
+          <a:p>
+            <a:pPr algn="ctr"/>
+            <a:endParaRPr lang="ko-KR" altLang="en-US"/>
+          </a:p>
+        </p:txBody>
+      </p:sp>
+      <p:sp>
+        <p:nvSpPr>
+          <p:cNvPr id="49" name="타원 48">
+            <a:extLst>
+              <a:ext uri="{FF2B5EF4-FFF2-40B4-BE49-F238E27FC236}">
+                <a16:creationId xmlns:a16="http://schemas.microsoft.com/office/drawing/2014/main" id="{E2F2619E-9FA1-F028-1416-999782E64F49}"/>
+              </a:ext>
+            </a:extLst>
+          </p:cNvPr>
+          <p:cNvSpPr/>
+          <p:nvPr/>
+        </p:nvSpPr>
+        <p:spPr>
+          <a:xfrm>
+            <a:off x="7412174" y="707150"/>
+            <a:ext cx="230909" cy="230909"/>
+          </a:xfrm>
+          <a:prstGeom prst="ellipse">
+            <a:avLst/>
+          </a:prstGeom>
+          <a:solidFill>
+            <a:schemeClr val="accent1">
+              <a:lumMod val="20000"/>
+              <a:lumOff val="80000"/>
+            </a:schemeClr>
+          </a:solidFill>
+        </p:spPr>
+        <p:style>
+          <a:lnRef idx="2">
+            <a:schemeClr val="dk1"/>
+          </a:lnRef>
+          <a:fillRef idx="1">
+            <a:schemeClr val="lt1"/>
+          </a:fillRef>
+          <a:effectRef idx="0">
+            <a:schemeClr val="dk1"/>
+          </a:effectRef>
+          <a:fontRef idx="minor">
+            <a:schemeClr val="dk1"/>
+          </a:fontRef>
+        </p:style>
+        <p:txBody>
+          <a:bodyPr rtlCol="0" anchor="ctr"/>
+          <a:lstStyle/>
+          <a:p>
+            <a:pPr algn="ctr"/>
+            <a:endParaRPr lang="ko-KR" altLang="en-US"/>
+          </a:p>
+        </p:txBody>
+      </p:sp>
+      <p:sp>
+        <p:nvSpPr>
+          <p:cNvPr id="50" name="타원 49">
+            <a:extLst>
+              <a:ext uri="{FF2B5EF4-FFF2-40B4-BE49-F238E27FC236}">
+                <a16:creationId xmlns:a16="http://schemas.microsoft.com/office/drawing/2014/main" id="{E3305FB3-864D-DF0A-327B-7EEBD8CC2C3A}"/>
+              </a:ext>
+            </a:extLst>
+          </p:cNvPr>
+          <p:cNvSpPr/>
+          <p:nvPr/>
+        </p:nvSpPr>
+        <p:spPr>
+          <a:xfrm>
+            <a:off x="7416793" y="1500080"/>
+            <a:ext cx="230909" cy="230909"/>
+          </a:xfrm>
+          <a:prstGeom prst="ellipse">
+            <a:avLst/>
+          </a:prstGeom>
+          <a:solidFill>
+            <a:schemeClr val="accent1">
+              <a:lumMod val="20000"/>
+              <a:lumOff val="80000"/>
+            </a:schemeClr>
+          </a:solidFill>
+        </p:spPr>
+        <p:style>
+          <a:lnRef idx="2">
+            <a:schemeClr val="dk1"/>
+          </a:lnRef>
+          <a:fillRef idx="1">
+            <a:schemeClr val="lt1"/>
+          </a:fillRef>
+          <a:effectRef idx="0">
+            <a:schemeClr val="dk1"/>
+          </a:effectRef>
+          <a:fontRef idx="minor">
+            <a:schemeClr val="dk1"/>
+          </a:fontRef>
+        </p:style>
+        <p:txBody>
+          <a:bodyPr rtlCol="0" anchor="ctr"/>
+          <a:lstStyle/>
+          <a:p>
+            <a:pPr algn="ctr"/>
+            <a:endParaRPr lang="ko-KR" altLang="en-US"/>
+          </a:p>
+        </p:txBody>
+      </p:sp>
+      <p:sp>
+        <p:nvSpPr>
+          <p:cNvPr id="51" name="타원 50">
+            <a:extLst>
+              <a:ext uri="{FF2B5EF4-FFF2-40B4-BE49-F238E27FC236}">
+                <a16:creationId xmlns:a16="http://schemas.microsoft.com/office/drawing/2014/main" id="{723F99E6-3428-CFE9-AFCF-9C2364451294}"/>
+              </a:ext>
+            </a:extLst>
+          </p:cNvPr>
+          <p:cNvSpPr/>
+          <p:nvPr/>
+        </p:nvSpPr>
+        <p:spPr>
+          <a:xfrm>
+            <a:off x="7412174" y="2336856"/>
+            <a:ext cx="230909" cy="230909"/>
+          </a:xfrm>
+          <a:prstGeom prst="ellipse">
+            <a:avLst/>
+          </a:prstGeom>
+          <a:solidFill>
+            <a:schemeClr val="accent2">
+              <a:lumMod val="20000"/>
+              <a:lumOff val="80000"/>
+            </a:schemeClr>
+          </a:solidFill>
+        </p:spPr>
+        <p:style>
+          <a:lnRef idx="2">
+            <a:schemeClr val="dk1"/>
+          </a:lnRef>
+          <a:fillRef idx="1">
+            <a:schemeClr val="lt1"/>
+          </a:fillRef>
+          <a:effectRef idx="0">
+            <a:schemeClr val="dk1"/>
+          </a:effectRef>
+          <a:fontRef idx="minor">
+            <a:schemeClr val="dk1"/>
+          </a:fontRef>
+        </p:style>
+        <p:txBody>
+          <a:bodyPr rtlCol="0" anchor="ctr"/>
+          <a:lstStyle/>
+          <a:p>
+            <a:pPr algn="ctr"/>
+            <a:endParaRPr lang="ko-KR" altLang="en-US"/>
+          </a:p>
+        </p:txBody>
+      </p:sp>
+      <p:sp>
+        <p:nvSpPr>
+          <p:cNvPr id="53" name="타원 52">
+            <a:extLst>
+              <a:ext uri="{FF2B5EF4-FFF2-40B4-BE49-F238E27FC236}">
+                <a16:creationId xmlns:a16="http://schemas.microsoft.com/office/drawing/2014/main" id="{45AA8923-A44B-B476-9C30-91BB705D2CE0}"/>
+              </a:ext>
+            </a:extLst>
+          </p:cNvPr>
+          <p:cNvSpPr/>
+          <p:nvPr/>
+        </p:nvSpPr>
+        <p:spPr>
+          <a:xfrm>
+            <a:off x="7412174" y="3134317"/>
+            <a:ext cx="230909" cy="230909"/>
+          </a:xfrm>
+          <a:prstGeom prst="ellipse">
+            <a:avLst/>
+          </a:prstGeom>
+          <a:solidFill>
+            <a:schemeClr val="accent2">
+              <a:lumMod val="20000"/>
+              <a:lumOff val="80000"/>
+            </a:schemeClr>
+          </a:solidFill>
+        </p:spPr>
+        <p:style>
+          <a:lnRef idx="2">
+            <a:schemeClr val="dk1"/>
+          </a:lnRef>
+          <a:fillRef idx="1">
+            <a:schemeClr val="lt1"/>
+          </a:fillRef>
+          <a:effectRef idx="0">
+            <a:schemeClr val="dk1"/>
+          </a:effectRef>
+          <a:fontRef idx="minor">
+            <a:schemeClr val="dk1"/>
+          </a:fontRef>
+        </p:style>
+        <p:txBody>
+          <a:bodyPr rtlCol="0" anchor="ctr"/>
+          <a:lstStyle/>
+          <a:p>
+            <a:pPr algn="ctr"/>
+            <a:endParaRPr lang="ko-KR" altLang="en-US"/>
+          </a:p>
+        </p:txBody>
+      </p:sp>
+      <p:sp>
+        <p:nvSpPr>
+          <p:cNvPr id="54" name="타원 53">
+            <a:extLst>
+              <a:ext uri="{FF2B5EF4-FFF2-40B4-BE49-F238E27FC236}">
+                <a16:creationId xmlns:a16="http://schemas.microsoft.com/office/drawing/2014/main" id="{7881910A-EC66-425A-1381-E9C138C0B0C0}"/>
+              </a:ext>
+            </a:extLst>
+          </p:cNvPr>
+          <p:cNvSpPr/>
+          <p:nvPr/>
+        </p:nvSpPr>
+        <p:spPr>
+          <a:xfrm>
+            <a:off x="7412174" y="3960460"/>
+            <a:ext cx="230909" cy="230909"/>
+          </a:xfrm>
+          <a:prstGeom prst="ellipse">
+            <a:avLst/>
+          </a:prstGeom>
+          <a:solidFill>
+            <a:schemeClr val="accent2">
+              <a:lumMod val="20000"/>
+              <a:lumOff val="80000"/>
+            </a:schemeClr>
+          </a:solidFill>
+        </p:spPr>
+        <p:style>
+          <a:lnRef idx="2">
+            <a:schemeClr val="dk1"/>
+          </a:lnRef>
+          <a:fillRef idx="1">
+            <a:schemeClr val="lt1"/>
+          </a:fillRef>
+          <a:effectRef idx="0">
+            <a:schemeClr val="dk1"/>
+          </a:effectRef>
+          <a:fontRef idx="minor">
+            <a:schemeClr val="dk1"/>
+          </a:fontRef>
+        </p:style>
+        <p:txBody>
+          <a:bodyPr rtlCol="0" anchor="ctr"/>
+          <a:lstStyle/>
+          <a:p>
+            <a:pPr algn="ctr"/>
+            <a:endParaRPr lang="ko-KR" altLang="en-US"/>
+          </a:p>
+        </p:txBody>
+      </p:sp>
+      <p:sp>
+        <p:nvSpPr>
+          <p:cNvPr id="55" name="타원 54">
+            <a:extLst>
+              <a:ext uri="{FF2B5EF4-FFF2-40B4-BE49-F238E27FC236}">
+                <a16:creationId xmlns:a16="http://schemas.microsoft.com/office/drawing/2014/main" id="{22B7BEDA-AEAA-17B3-BE3F-FB81F94FC98F}"/>
+              </a:ext>
+            </a:extLst>
+          </p:cNvPr>
+          <p:cNvSpPr/>
+          <p:nvPr/>
+        </p:nvSpPr>
+        <p:spPr>
+          <a:xfrm>
+            <a:off x="6622468" y="707149"/>
+            <a:ext cx="230909" cy="230909"/>
+          </a:xfrm>
+          <a:prstGeom prst="ellipse">
+            <a:avLst/>
+          </a:prstGeom>
+          <a:solidFill>
+            <a:schemeClr val="accent2">
+              <a:lumMod val="20000"/>
+              <a:lumOff val="80000"/>
+            </a:schemeClr>
+          </a:solidFill>
+        </p:spPr>
+        <p:style>
+          <a:lnRef idx="2">
+            <a:schemeClr val="dk1"/>
+          </a:lnRef>
+          <a:fillRef idx="1">
+            <a:schemeClr val="lt1"/>
+          </a:fillRef>
+          <a:effectRef idx="0">
+            <a:schemeClr val="dk1"/>
+          </a:effectRef>
+          <a:fontRef idx="minor">
+            <a:schemeClr val="dk1"/>
+          </a:fontRef>
+        </p:style>
+        <p:txBody>
+          <a:bodyPr rtlCol="0" anchor="ctr"/>
+          <a:lstStyle/>
+          <a:p>
+            <a:pPr algn="ctr"/>
+            <a:endParaRPr lang="ko-KR" altLang="en-US"/>
+          </a:p>
+        </p:txBody>
+      </p:sp>
+      <p:sp>
+        <p:nvSpPr>
+          <p:cNvPr id="56" name="타원 55">
+            <a:extLst>
+              <a:ext uri="{FF2B5EF4-FFF2-40B4-BE49-F238E27FC236}">
+                <a16:creationId xmlns:a16="http://schemas.microsoft.com/office/drawing/2014/main" id="{03A1DB55-D91F-C378-D197-D14A2D48F77D}"/>
+              </a:ext>
+            </a:extLst>
+          </p:cNvPr>
+          <p:cNvSpPr/>
+          <p:nvPr/>
+        </p:nvSpPr>
+        <p:spPr>
+          <a:xfrm>
+            <a:off x="6622468" y="1500079"/>
+            <a:ext cx="230909" cy="230909"/>
+          </a:xfrm>
+          <a:prstGeom prst="ellipse">
+            <a:avLst/>
+          </a:prstGeom>
+          <a:solidFill>
+            <a:schemeClr val="accent6">
+              <a:lumMod val="20000"/>
+              <a:lumOff val="80000"/>
+            </a:schemeClr>
+          </a:solidFill>
+        </p:spPr>
+        <p:style>
+          <a:lnRef idx="2">
+            <a:schemeClr val="dk1"/>
+          </a:lnRef>
+          <a:fillRef idx="1">
+            <a:schemeClr val="lt1"/>
+          </a:fillRef>
+          <a:effectRef idx="0">
+            <a:schemeClr val="dk1"/>
+          </a:effectRef>
+          <a:fontRef idx="minor">
+            <a:schemeClr val="dk1"/>
+          </a:fontRef>
+        </p:style>
+        <p:txBody>
+          <a:bodyPr rtlCol="0" anchor="ctr"/>
+          <a:lstStyle/>
+          <a:p>
+            <a:pPr algn="ctr"/>
+            <a:endParaRPr lang="ko-KR" altLang="en-US"/>
+          </a:p>
+        </p:txBody>
+      </p:sp>
+      <p:sp>
+        <p:nvSpPr>
+          <p:cNvPr id="57" name="타원 56">
+            <a:extLst>
+              <a:ext uri="{FF2B5EF4-FFF2-40B4-BE49-F238E27FC236}">
+                <a16:creationId xmlns:a16="http://schemas.microsoft.com/office/drawing/2014/main" id="{8F4B4591-4FDD-D4F5-9188-84837AC6C885}"/>
+              </a:ext>
+            </a:extLst>
+          </p:cNvPr>
+          <p:cNvSpPr/>
+          <p:nvPr/>
+        </p:nvSpPr>
+        <p:spPr>
+          <a:xfrm>
+            <a:off x="6622468" y="2337742"/>
+            <a:ext cx="230909" cy="230909"/>
+          </a:xfrm>
+          <a:prstGeom prst="ellipse">
+            <a:avLst/>
+          </a:prstGeom>
+          <a:solidFill>
+            <a:schemeClr val="accent6">
+              <a:lumMod val="20000"/>
+              <a:lumOff val="80000"/>
+            </a:schemeClr>
+          </a:solidFill>
+        </p:spPr>
+        <p:style>
+          <a:lnRef idx="2">
+            <a:schemeClr val="dk1"/>
+          </a:lnRef>
+          <a:fillRef idx="1">
+            <a:schemeClr val="lt1"/>
+          </a:fillRef>
+          <a:effectRef idx="0">
+            <a:schemeClr val="dk1"/>
+          </a:effectRef>
+          <a:fontRef idx="minor">
+            <a:schemeClr val="dk1"/>
+          </a:fontRef>
+        </p:style>
+        <p:txBody>
+          <a:bodyPr rtlCol="0" anchor="ctr"/>
+          <a:lstStyle/>
+          <a:p>
+            <a:pPr algn="ctr"/>
+            <a:endParaRPr lang="ko-KR" altLang="en-US"/>
+          </a:p>
+        </p:txBody>
+      </p:sp>
+      <p:sp>
+        <p:nvSpPr>
+          <p:cNvPr id="58" name="타원 57">
+            <a:extLst>
+              <a:ext uri="{FF2B5EF4-FFF2-40B4-BE49-F238E27FC236}">
+                <a16:creationId xmlns:a16="http://schemas.microsoft.com/office/drawing/2014/main" id="{D449710D-49CA-408A-B336-8DE3F81314AC}"/>
+              </a:ext>
+            </a:extLst>
+          </p:cNvPr>
+          <p:cNvSpPr/>
+          <p:nvPr/>
+        </p:nvSpPr>
+        <p:spPr>
+          <a:xfrm>
+            <a:off x="6622468" y="3125080"/>
+            <a:ext cx="230909" cy="230909"/>
+          </a:xfrm>
+          <a:prstGeom prst="ellipse">
+            <a:avLst/>
+          </a:prstGeom>
+          <a:solidFill>
+            <a:schemeClr val="accent6">
+              <a:lumMod val="20000"/>
+              <a:lumOff val="80000"/>
+            </a:schemeClr>
+          </a:solidFill>
+        </p:spPr>
+        <p:style>
+          <a:lnRef idx="2">
+            <a:schemeClr val="dk1"/>
+          </a:lnRef>
+          <a:fillRef idx="1">
+            <a:schemeClr val="lt1"/>
+          </a:fillRef>
+          <a:effectRef idx="0">
+            <a:schemeClr val="dk1"/>
+          </a:effectRef>
+          <a:fontRef idx="minor">
+            <a:schemeClr val="dk1"/>
+          </a:fontRef>
+        </p:style>
+        <p:txBody>
+          <a:bodyPr rtlCol="0" anchor="ctr"/>
+          <a:lstStyle/>
+          <a:p>
+            <a:pPr algn="ctr"/>
+            <a:endParaRPr lang="ko-KR" altLang="en-US"/>
+          </a:p>
+        </p:txBody>
+      </p:sp>
+      <p:sp>
+        <p:nvSpPr>
+          <p:cNvPr id="59" name="타원 58">
+            <a:extLst>
+              <a:ext uri="{FF2B5EF4-FFF2-40B4-BE49-F238E27FC236}">
+                <a16:creationId xmlns:a16="http://schemas.microsoft.com/office/drawing/2014/main" id="{8D2E104E-AE79-8574-F2C9-C4414BF087BD}"/>
+              </a:ext>
+            </a:extLst>
+          </p:cNvPr>
+          <p:cNvSpPr/>
+          <p:nvPr/>
+        </p:nvSpPr>
+        <p:spPr>
+          <a:xfrm>
+            <a:off x="6622468" y="3960460"/>
+            <a:ext cx="230909" cy="230909"/>
+          </a:xfrm>
+          <a:prstGeom prst="ellipse">
+            <a:avLst/>
+          </a:prstGeom>
+          <a:solidFill>
+            <a:schemeClr val="accent6">
+              <a:lumMod val="20000"/>
+              <a:lumOff val="80000"/>
+            </a:schemeClr>
+          </a:solidFill>
+        </p:spPr>
+        <p:style>
+          <a:lnRef idx="2">
+            <a:schemeClr val="dk1"/>
+          </a:lnRef>
+          <a:fillRef idx="1">
+            <a:schemeClr val="lt1"/>
+          </a:fillRef>
+          <a:effectRef idx="0">
+            <a:schemeClr val="dk1"/>
+          </a:effectRef>
+          <a:fontRef idx="minor">
+            <a:schemeClr val="dk1"/>
+          </a:fontRef>
+        </p:style>
+        <p:txBody>
+          <a:bodyPr rtlCol="0" anchor="ctr"/>
+          <a:lstStyle/>
+          <a:p>
+            <a:pPr algn="ctr"/>
+            <a:endParaRPr lang="ko-KR" altLang="en-US"/>
+          </a:p>
+        </p:txBody>
+      </p:sp>
+      <p:sp>
+        <p:nvSpPr>
+          <p:cNvPr id="60" name="타원 59">
+            <a:extLst>
+              <a:ext uri="{FF2B5EF4-FFF2-40B4-BE49-F238E27FC236}">
+                <a16:creationId xmlns:a16="http://schemas.microsoft.com/office/drawing/2014/main" id="{2700903F-D89B-78EB-BDFD-AC2F6ED10F45}"/>
+              </a:ext>
+            </a:extLst>
+          </p:cNvPr>
+          <p:cNvSpPr/>
+          <p:nvPr/>
+        </p:nvSpPr>
+        <p:spPr>
+          <a:xfrm>
+            <a:off x="5777341" y="707148"/>
+            <a:ext cx="230909" cy="230909"/>
+          </a:xfrm>
+          <a:prstGeom prst="ellipse">
+            <a:avLst/>
+          </a:prstGeom>
+          <a:solidFill>
+            <a:schemeClr val="bg1">
+              <a:lumMod val="85000"/>
+            </a:schemeClr>
+          </a:solidFill>
+        </p:spPr>
+        <p:style>
+          <a:lnRef idx="2">
+            <a:schemeClr val="dk1"/>
+          </a:lnRef>
+          <a:fillRef idx="1">
+            <a:schemeClr val="lt1"/>
+          </a:fillRef>
+          <a:effectRef idx="0">
+            <a:schemeClr val="dk1"/>
+          </a:effectRef>
+          <a:fontRef idx="minor">
+            <a:schemeClr val="dk1"/>
+          </a:fontRef>
+        </p:style>
+        <p:txBody>
+          <a:bodyPr rtlCol="0" anchor="ctr"/>
+          <a:lstStyle/>
+          <a:p>
+            <a:pPr algn="ctr"/>
+            <a:endParaRPr lang="ko-KR" altLang="en-US"/>
+          </a:p>
+        </p:txBody>
+      </p:sp>
+      <p:sp>
+        <p:nvSpPr>
+          <p:cNvPr id="61" name="타원 60">
+            <a:extLst>
+              <a:ext uri="{FF2B5EF4-FFF2-40B4-BE49-F238E27FC236}">
+                <a16:creationId xmlns:a16="http://schemas.microsoft.com/office/drawing/2014/main" id="{D32A741C-F400-FDD7-A726-930585C0221A}"/>
+              </a:ext>
+            </a:extLst>
+          </p:cNvPr>
+          <p:cNvSpPr/>
+          <p:nvPr/>
+        </p:nvSpPr>
+        <p:spPr>
+          <a:xfrm>
+            <a:off x="5777341" y="1500078"/>
+            <a:ext cx="230909" cy="230909"/>
+          </a:xfrm>
+          <a:prstGeom prst="ellipse">
+            <a:avLst/>
+          </a:prstGeom>
+          <a:solidFill>
+            <a:schemeClr val="bg1">
+              <a:lumMod val="85000"/>
+            </a:schemeClr>
+          </a:solidFill>
+        </p:spPr>
+        <p:style>
+          <a:lnRef idx="2">
+            <a:schemeClr val="dk1"/>
+          </a:lnRef>
+          <a:fillRef idx="1">
+            <a:schemeClr val="lt1"/>
+          </a:fillRef>
+          <a:effectRef idx="0">
+            <a:schemeClr val="dk1"/>
+          </a:effectRef>
+          <a:fontRef idx="minor">
+            <a:schemeClr val="dk1"/>
+          </a:fontRef>
+        </p:style>
+        <p:txBody>
+          <a:bodyPr rtlCol="0" anchor="ctr"/>
+          <a:lstStyle/>
+          <a:p>
+            <a:pPr algn="ctr"/>
+            <a:endParaRPr lang="ko-KR" altLang="en-US"/>
+          </a:p>
+        </p:txBody>
+      </p:sp>
+      <p:sp>
+        <p:nvSpPr>
+          <p:cNvPr id="62" name="타원 61">
+            <a:extLst>
+              <a:ext uri="{FF2B5EF4-FFF2-40B4-BE49-F238E27FC236}">
+                <a16:creationId xmlns:a16="http://schemas.microsoft.com/office/drawing/2014/main" id="{E3C6E4E4-D3FA-C87F-9EC0-2DCA313B81E4}"/>
+              </a:ext>
+            </a:extLst>
+          </p:cNvPr>
+          <p:cNvSpPr/>
+          <p:nvPr/>
+        </p:nvSpPr>
+        <p:spPr>
+          <a:xfrm>
+            <a:off x="5781956" y="2336855"/>
+            <a:ext cx="230909" cy="230909"/>
+          </a:xfrm>
+          <a:prstGeom prst="ellipse">
+            <a:avLst/>
+          </a:prstGeom>
+          <a:solidFill>
+            <a:schemeClr val="bg1">
+              <a:lumMod val="85000"/>
+            </a:schemeClr>
+          </a:solidFill>
+        </p:spPr>
+        <p:style>
+          <a:lnRef idx="2">
+            <a:schemeClr val="dk1"/>
+          </a:lnRef>
+          <a:fillRef idx="1">
+            <a:schemeClr val="lt1"/>
+          </a:fillRef>
+          <a:effectRef idx="0">
+            <a:schemeClr val="dk1"/>
+          </a:effectRef>
+          <a:fontRef idx="minor">
+            <a:schemeClr val="dk1"/>
+          </a:fontRef>
+        </p:style>
+        <p:txBody>
+          <a:bodyPr rtlCol="0" anchor="ctr"/>
+          <a:lstStyle/>
+          <a:p>
+            <a:pPr algn="ctr"/>
+            <a:endParaRPr lang="ko-KR" altLang="en-US"/>
+          </a:p>
+        </p:txBody>
+      </p:sp>
+      <p:sp>
+        <p:nvSpPr>
+          <p:cNvPr id="63" name="타원 62">
+            <a:extLst>
+              <a:ext uri="{FF2B5EF4-FFF2-40B4-BE49-F238E27FC236}">
+                <a16:creationId xmlns:a16="http://schemas.microsoft.com/office/drawing/2014/main" id="{2DEF148F-87C1-55DF-7163-DE980BBB0369}"/>
+              </a:ext>
+            </a:extLst>
+          </p:cNvPr>
+          <p:cNvSpPr/>
+          <p:nvPr/>
+        </p:nvSpPr>
+        <p:spPr>
+          <a:xfrm>
+            <a:off x="5777341" y="3125080"/>
+            <a:ext cx="230909" cy="230909"/>
+          </a:xfrm>
+          <a:prstGeom prst="ellipse">
+            <a:avLst/>
+          </a:prstGeom>
+          <a:solidFill>
+            <a:schemeClr val="bg1">
+              <a:lumMod val="85000"/>
+            </a:schemeClr>
+          </a:solidFill>
+        </p:spPr>
+        <p:style>
+          <a:lnRef idx="2">
+            <a:schemeClr val="dk1"/>
+          </a:lnRef>
+          <a:fillRef idx="1">
+            <a:schemeClr val="lt1"/>
+          </a:fillRef>
+          <a:effectRef idx="0">
+            <a:schemeClr val="dk1"/>
+          </a:effectRef>
+          <a:fontRef idx="minor">
+            <a:schemeClr val="dk1"/>
+          </a:fontRef>
+        </p:style>
+        <p:txBody>
+          <a:bodyPr rtlCol="0" anchor="ctr"/>
+          <a:lstStyle/>
+          <a:p>
+            <a:pPr algn="ctr"/>
+            <a:endParaRPr lang="ko-KR" altLang="en-US"/>
+          </a:p>
+        </p:txBody>
+      </p:sp>
+      <p:sp>
+        <p:nvSpPr>
+          <p:cNvPr id="64" name="타원 63">
+            <a:extLst>
+              <a:ext uri="{FF2B5EF4-FFF2-40B4-BE49-F238E27FC236}">
+                <a16:creationId xmlns:a16="http://schemas.microsoft.com/office/drawing/2014/main" id="{869BB041-8434-51DB-9479-2038BB62EEA9}"/>
+              </a:ext>
+            </a:extLst>
+          </p:cNvPr>
+          <p:cNvSpPr/>
+          <p:nvPr/>
+        </p:nvSpPr>
+        <p:spPr>
+          <a:xfrm>
+            <a:off x="5781962" y="3960459"/>
+            <a:ext cx="230909" cy="230909"/>
+          </a:xfrm>
+          <a:prstGeom prst="ellipse">
+            <a:avLst/>
+          </a:prstGeom>
+          <a:solidFill>
+            <a:schemeClr val="accent2">
+              <a:lumMod val="75000"/>
+            </a:schemeClr>
+          </a:solidFill>
+        </p:spPr>
+        <p:style>
+          <a:lnRef idx="2">
+            <a:schemeClr val="dk1"/>
+          </a:lnRef>
+          <a:fillRef idx="1">
+            <a:schemeClr val="lt1"/>
+          </a:fillRef>
+          <a:effectRef idx="0">
+            <a:schemeClr val="dk1"/>
+          </a:effectRef>
+          <a:fontRef idx="minor">
+            <a:schemeClr val="dk1"/>
+          </a:fontRef>
+        </p:style>
+        <p:txBody>
+          <a:bodyPr rtlCol="0" anchor="ctr"/>
+          <a:lstStyle/>
+          <a:p>
+            <a:pPr algn="ctr"/>
+            <a:endParaRPr lang="ko-KR" altLang="en-US"/>
+          </a:p>
+        </p:txBody>
+      </p:sp>
+      <p:grpSp>
+        <p:nvGrpSpPr>
+          <p:cNvPr id="72" name="그룹 71">
+            <a:extLst>
+              <a:ext uri="{FF2B5EF4-FFF2-40B4-BE49-F238E27FC236}">
+                <a16:creationId xmlns:a16="http://schemas.microsoft.com/office/drawing/2014/main" id="{86DCD3C9-853C-98F0-EA03-8D7F31CD7035}"/>
+              </a:ext>
+            </a:extLst>
+          </p:cNvPr>
+          <p:cNvGrpSpPr/>
+          <p:nvPr/>
+        </p:nvGrpSpPr>
+        <p:grpSpPr>
+          <a:xfrm>
+            <a:off x="5874323" y="4987859"/>
+            <a:ext cx="2992590" cy="230911"/>
+            <a:chOff x="2022758" y="4812369"/>
+            <a:chExt cx="2992590" cy="230911"/>
+          </a:xfrm>
+        </p:grpSpPr>
+        <p:sp>
+          <p:nvSpPr>
+            <p:cNvPr id="65" name="타원 64">
+              <a:extLst>
+                <a:ext uri="{FF2B5EF4-FFF2-40B4-BE49-F238E27FC236}">
+                  <a16:creationId xmlns:a16="http://schemas.microsoft.com/office/drawing/2014/main" id="{A9DDA64E-5BE5-54D1-7F89-E9D3E932FA17}"/>
+                </a:ext>
+              </a:extLst>
+            </p:cNvPr>
+            <p:cNvSpPr/>
+            <p:nvPr/>
+          </p:nvSpPr>
+          <p:spPr>
+            <a:xfrm>
+              <a:off x="4784439" y="4812371"/>
+              <a:ext cx="230909" cy="230909"/>
+            </a:xfrm>
+            <a:prstGeom prst="ellipse">
+              <a:avLst/>
+            </a:prstGeom>
+            <a:solidFill>
+              <a:srgbClr val="FEE19A"/>
+            </a:solidFill>
+          </p:spPr>
+          <p:style>
+            <a:lnRef idx="2">
+              <a:schemeClr val="dk1"/>
+            </a:lnRef>
+            <a:fillRef idx="1">
+              <a:schemeClr val="lt1"/>
+            </a:fillRef>
+            <a:effectRef idx="0">
+              <a:schemeClr val="dk1"/>
+            </a:effectRef>
+            <a:fontRef idx="minor">
+              <a:schemeClr val="dk1"/>
+            </a:fontRef>
+          </p:style>
+          <p:txBody>
+            <a:bodyPr rtlCol="0" anchor="ctr"/>
+            <a:lstStyle/>
+            <a:p>
+              <a:pPr algn="ctr"/>
+              <a:endParaRPr lang="ko-KR" altLang="en-US"/>
+            </a:p>
+          </p:txBody>
+        </p:sp>
+        <p:sp>
+          <p:nvSpPr>
+            <p:cNvPr id="66" name="타원 65">
+              <a:extLst>
+                <a:ext uri="{FF2B5EF4-FFF2-40B4-BE49-F238E27FC236}">
+                  <a16:creationId xmlns:a16="http://schemas.microsoft.com/office/drawing/2014/main" id="{2DEBA48F-12A9-713D-05E4-4388B012E079}"/>
+                </a:ext>
+              </a:extLst>
+            </p:cNvPr>
+            <p:cNvSpPr/>
+            <p:nvPr/>
+          </p:nvSpPr>
+          <p:spPr>
+            <a:xfrm>
+              <a:off x="4327239" y="4812371"/>
+              <a:ext cx="230909" cy="230909"/>
+            </a:xfrm>
+            <a:prstGeom prst="ellipse">
+              <a:avLst/>
+            </a:prstGeom>
+            <a:solidFill>
+              <a:srgbClr val="FF99CC"/>
+            </a:solidFill>
+          </p:spPr>
+          <p:style>
+            <a:lnRef idx="2">
+              <a:schemeClr val="dk1"/>
+            </a:lnRef>
+            <a:fillRef idx="1">
+              <a:schemeClr val="lt1"/>
+            </a:fillRef>
+            <a:effectRef idx="0">
+              <a:schemeClr val="dk1"/>
+            </a:effectRef>
+            <a:fontRef idx="minor">
+              <a:schemeClr val="dk1"/>
+            </a:fontRef>
+          </p:style>
+          <p:txBody>
+            <a:bodyPr rtlCol="0" anchor="ctr"/>
+            <a:lstStyle/>
+            <a:p>
+              <a:pPr algn="ctr"/>
+              <a:endParaRPr lang="ko-KR" altLang="en-US"/>
+            </a:p>
+          </p:txBody>
+        </p:sp>
+        <p:sp>
+          <p:nvSpPr>
+            <p:cNvPr id="67" name="타원 66">
+              <a:extLst>
+                <a:ext uri="{FF2B5EF4-FFF2-40B4-BE49-F238E27FC236}">
+                  <a16:creationId xmlns:a16="http://schemas.microsoft.com/office/drawing/2014/main" id="{C9D484C1-3A7F-6B97-4493-BFF656A79D87}"/>
+                </a:ext>
+              </a:extLst>
+            </p:cNvPr>
+            <p:cNvSpPr/>
+            <p:nvPr/>
+          </p:nvSpPr>
+          <p:spPr>
+            <a:xfrm>
+              <a:off x="3865421" y="4812371"/>
+              <a:ext cx="230909" cy="230909"/>
+            </a:xfrm>
+            <a:prstGeom prst="ellipse">
+              <a:avLst/>
+            </a:prstGeom>
+            <a:solidFill>
+              <a:schemeClr val="accent1">
+                <a:lumMod val="20000"/>
+                <a:lumOff val="80000"/>
+              </a:schemeClr>
+            </a:solidFill>
+          </p:spPr>
+          <p:style>
+            <a:lnRef idx="2">
+              <a:schemeClr val="dk1"/>
+            </a:lnRef>
+            <a:fillRef idx="1">
+              <a:schemeClr val="lt1"/>
+            </a:fillRef>
+            <a:effectRef idx="0">
+              <a:schemeClr val="dk1"/>
+            </a:effectRef>
+            <a:fontRef idx="minor">
+              <a:schemeClr val="dk1"/>
+            </a:fontRef>
+          </p:style>
+          <p:txBody>
+            <a:bodyPr rtlCol="0" anchor="ctr"/>
+            <a:lstStyle/>
+            <a:p>
+              <a:pPr algn="ctr"/>
+              <a:endParaRPr lang="ko-KR" altLang="en-US"/>
+            </a:p>
+          </p:txBody>
+        </p:sp>
+        <p:sp>
+          <p:nvSpPr>
+            <p:cNvPr id="68" name="타원 67">
+              <a:extLst>
+                <a:ext uri="{FF2B5EF4-FFF2-40B4-BE49-F238E27FC236}">
+                  <a16:creationId xmlns:a16="http://schemas.microsoft.com/office/drawing/2014/main" id="{0DAA98BE-E3B2-44E8-C313-78E6C464E46E}"/>
+                </a:ext>
+              </a:extLst>
+            </p:cNvPr>
+            <p:cNvSpPr/>
+            <p:nvPr/>
+          </p:nvSpPr>
+          <p:spPr>
+            <a:xfrm>
+              <a:off x="3408221" y="4812371"/>
+              <a:ext cx="230909" cy="230909"/>
+            </a:xfrm>
+            <a:prstGeom prst="ellipse">
+              <a:avLst/>
+            </a:prstGeom>
+            <a:solidFill>
+              <a:schemeClr val="accent2">
+                <a:lumMod val="20000"/>
+                <a:lumOff val="80000"/>
+              </a:schemeClr>
+            </a:solidFill>
+          </p:spPr>
+          <p:style>
+            <a:lnRef idx="2">
+              <a:schemeClr val="dk1"/>
+            </a:lnRef>
+            <a:fillRef idx="1">
+              <a:schemeClr val="lt1"/>
+            </a:fillRef>
+            <a:effectRef idx="0">
+              <a:schemeClr val="dk1"/>
+            </a:effectRef>
+            <a:fontRef idx="minor">
+              <a:schemeClr val="dk1"/>
+            </a:fontRef>
+          </p:style>
+          <p:txBody>
+            <a:bodyPr rtlCol="0" anchor="ctr"/>
+            <a:lstStyle/>
+            <a:p>
+              <a:pPr algn="ctr"/>
+              <a:endParaRPr lang="ko-KR" altLang="en-US"/>
+            </a:p>
+          </p:txBody>
+        </p:sp>
+        <p:sp>
+          <p:nvSpPr>
+            <p:cNvPr id="69" name="타원 68">
+              <a:extLst>
+                <a:ext uri="{FF2B5EF4-FFF2-40B4-BE49-F238E27FC236}">
+                  <a16:creationId xmlns:a16="http://schemas.microsoft.com/office/drawing/2014/main" id="{D6326EA0-3DDA-42A0-306B-65A932CB4564}"/>
+                </a:ext>
+              </a:extLst>
+            </p:cNvPr>
+            <p:cNvSpPr/>
+            <p:nvPr/>
+          </p:nvSpPr>
+          <p:spPr>
+            <a:xfrm>
+              <a:off x="2946400" y="4812370"/>
+              <a:ext cx="230909" cy="230909"/>
+            </a:xfrm>
+            <a:prstGeom prst="ellipse">
+              <a:avLst/>
+            </a:prstGeom>
+            <a:solidFill>
+              <a:schemeClr val="accent6">
+                <a:lumMod val="20000"/>
+                <a:lumOff val="80000"/>
+              </a:schemeClr>
+            </a:solidFill>
+          </p:spPr>
+          <p:style>
+            <a:lnRef idx="2">
+              <a:schemeClr val="dk1"/>
+            </a:lnRef>
+            <a:fillRef idx="1">
+              <a:schemeClr val="lt1"/>
+            </a:fillRef>
+            <a:effectRef idx="0">
+              <a:schemeClr val="dk1"/>
+            </a:effectRef>
+            <a:fontRef idx="minor">
+              <a:schemeClr val="dk1"/>
+            </a:fontRef>
+          </p:style>
+          <p:txBody>
+            <a:bodyPr rtlCol="0" anchor="ctr"/>
+            <a:lstStyle/>
+            <a:p>
+              <a:pPr algn="ctr"/>
+              <a:endParaRPr lang="ko-KR" altLang="en-US"/>
+            </a:p>
+          </p:txBody>
+        </p:sp>
+        <p:sp>
+          <p:nvSpPr>
+            <p:cNvPr id="70" name="타원 69">
+              <a:extLst>
+                <a:ext uri="{FF2B5EF4-FFF2-40B4-BE49-F238E27FC236}">
+                  <a16:creationId xmlns:a16="http://schemas.microsoft.com/office/drawing/2014/main" id="{EFCB32B7-387B-767E-3B3B-FE308E4043DD}"/>
+                </a:ext>
+              </a:extLst>
+            </p:cNvPr>
+            <p:cNvSpPr/>
+            <p:nvPr/>
+          </p:nvSpPr>
+          <p:spPr>
+            <a:xfrm>
+              <a:off x="2484579" y="4812370"/>
+              <a:ext cx="230909" cy="230909"/>
+            </a:xfrm>
+            <a:prstGeom prst="ellipse">
+              <a:avLst/>
+            </a:prstGeom>
+            <a:solidFill>
+              <a:schemeClr val="bg1">
+                <a:lumMod val="85000"/>
+              </a:schemeClr>
+            </a:solidFill>
+          </p:spPr>
+          <p:style>
+            <a:lnRef idx="2">
+              <a:schemeClr val="dk1"/>
+            </a:lnRef>
+            <a:fillRef idx="1">
+              <a:schemeClr val="lt1"/>
+            </a:fillRef>
+            <a:effectRef idx="0">
+              <a:schemeClr val="dk1"/>
+            </a:effectRef>
+            <a:fontRef idx="minor">
+              <a:schemeClr val="dk1"/>
+            </a:fontRef>
+          </p:style>
+          <p:txBody>
+            <a:bodyPr rtlCol="0" anchor="ctr"/>
+            <a:lstStyle/>
+            <a:p>
+              <a:pPr algn="ctr"/>
+              <a:endParaRPr lang="ko-KR" altLang="en-US"/>
+            </a:p>
+          </p:txBody>
+        </p:sp>
+        <p:sp>
+          <p:nvSpPr>
+            <p:cNvPr id="71" name="타원 70">
+              <a:extLst>
+                <a:ext uri="{FF2B5EF4-FFF2-40B4-BE49-F238E27FC236}">
+                  <a16:creationId xmlns:a16="http://schemas.microsoft.com/office/drawing/2014/main" id="{C708D7AD-90F0-BA3D-197C-D446533570CA}"/>
+                </a:ext>
+              </a:extLst>
+            </p:cNvPr>
+            <p:cNvSpPr/>
+            <p:nvPr/>
+          </p:nvSpPr>
+          <p:spPr>
+            <a:xfrm>
+              <a:off x="2022758" y="4812369"/>
+              <a:ext cx="230909" cy="230909"/>
+            </a:xfrm>
+            <a:prstGeom prst="ellipse">
+              <a:avLst/>
+            </a:prstGeom>
+            <a:solidFill>
+              <a:schemeClr val="accent2">
+                <a:lumMod val="75000"/>
+              </a:schemeClr>
+            </a:solidFill>
+          </p:spPr>
+          <p:style>
+            <a:lnRef idx="2">
+              <a:schemeClr val="dk1"/>
+            </a:lnRef>
+            <a:fillRef idx="1">
+              <a:schemeClr val="lt1"/>
+            </a:fillRef>
+            <a:effectRef idx="0">
+              <a:schemeClr val="dk1"/>
+            </a:effectRef>
+            <a:fontRef idx="minor">
+              <a:schemeClr val="dk1"/>
+            </a:fontRef>
+          </p:style>
+          <p:txBody>
+            <a:bodyPr rtlCol="0" anchor="ctr"/>
+            <a:lstStyle/>
+            <a:p>
+              <a:pPr algn="ctr"/>
+              <a:endParaRPr lang="ko-KR" altLang="en-US"/>
+            </a:p>
+          </p:txBody>
+        </p:sp>
+      </p:grpSp>
+      <p:sp>
+        <p:nvSpPr>
+          <p:cNvPr id="73" name="TextBox 72">
+            <a:extLst>
+              <a:ext uri="{FF2B5EF4-FFF2-40B4-BE49-F238E27FC236}">
+                <a16:creationId xmlns:a16="http://schemas.microsoft.com/office/drawing/2014/main" id="{DEE1FDC8-480A-3405-BB2D-78209CF25E0A}"/>
+              </a:ext>
+            </a:extLst>
+          </p:cNvPr>
+          <p:cNvSpPr txBox="1"/>
+          <p:nvPr/>
+        </p:nvSpPr>
+        <p:spPr>
+          <a:xfrm>
+            <a:off x="8192657" y="5372652"/>
+            <a:ext cx="1117601" cy="338554"/>
+          </a:xfrm>
+          <a:prstGeom prst="rect">
+            <a:avLst/>
+          </a:prstGeom>
+          <a:noFill/>
+        </p:spPr>
+        <p:txBody>
+          <a:bodyPr wrap="square" rtlCol="0">
+            <a:spAutoFit/>
+          </a:bodyPr>
+          <a:lstStyle/>
+          <a:p>
+            <a:pPr algn="ctr"/>
+            <a:r>
+              <a:rPr lang="en-US" altLang="ko-KR" sz="1600" b="1" dirty="0"/>
+              <a:t>0</a:t>
+            </a:r>
+            <a:endParaRPr lang="ko-KR" altLang="en-US" sz="1600" b="1" dirty="0"/>
+          </a:p>
+        </p:txBody>
+      </p:sp>
+      <p:sp>
+        <p:nvSpPr>
+          <p:cNvPr id="74" name="TextBox 73">
+            <a:extLst>
+              <a:ext uri="{FF2B5EF4-FFF2-40B4-BE49-F238E27FC236}">
+                <a16:creationId xmlns:a16="http://schemas.microsoft.com/office/drawing/2014/main" id="{877BE46F-F61B-3AFC-45C1-F219284F4740}"/>
+              </a:ext>
+            </a:extLst>
+          </p:cNvPr>
+          <p:cNvSpPr txBox="1"/>
+          <p:nvPr/>
+        </p:nvSpPr>
+        <p:spPr>
+          <a:xfrm>
+            <a:off x="5430976" y="5377666"/>
+            <a:ext cx="1117601" cy="338554"/>
+          </a:xfrm>
+          <a:prstGeom prst="rect">
+            <a:avLst/>
+          </a:prstGeom>
+          <a:noFill/>
+        </p:spPr>
+        <p:txBody>
+          <a:bodyPr wrap="square" rtlCol="0">
+            <a:spAutoFit/>
+          </a:bodyPr>
+          <a:lstStyle/>
+          <a:p>
+            <a:pPr algn="ctr"/>
+            <a:r>
+              <a:rPr lang="en-US" altLang="ko-KR" sz="1600" b="1" dirty="0"/>
+              <a:t>6</a:t>
+            </a:r>
+            <a:endParaRPr lang="ko-KR" altLang="en-US" sz="1600" b="1" dirty="0"/>
+          </a:p>
+        </p:txBody>
+      </p:sp>
+      <p:sp>
+        <p:nvSpPr>
+          <p:cNvPr id="75" name="화살표: 오른쪽 74">
+            <a:extLst>
+              <a:ext uri="{FF2B5EF4-FFF2-40B4-BE49-F238E27FC236}">
+                <a16:creationId xmlns:a16="http://schemas.microsoft.com/office/drawing/2014/main" id="{99D2581B-51E2-4EB2-E3C2-9D9528690837}"/>
+              </a:ext>
+            </a:extLst>
+          </p:cNvPr>
+          <p:cNvSpPr/>
+          <p:nvPr/>
+        </p:nvSpPr>
+        <p:spPr>
+          <a:xfrm rot="10800000">
+            <a:off x="6493156" y="5399050"/>
+            <a:ext cx="1838036" cy="285758"/>
+          </a:xfrm>
+          <a:prstGeom prst="rightArrow">
+            <a:avLst/>
+          </a:prstGeom>
+        </p:spPr>
+        <p:style>
+          <a:lnRef idx="2">
+            <a:schemeClr val="dk1"/>
+          </a:lnRef>
+          <a:fillRef idx="1">
+            <a:schemeClr val="lt1"/>
+          </a:fillRef>
+          <a:effectRef idx="0">
+            <a:schemeClr val="dk1"/>
+          </a:effectRef>
+          <a:fontRef idx="minor">
+            <a:schemeClr val="dk1"/>
+          </a:fontRef>
+        </p:style>
+        <p:txBody>
+          <a:bodyPr rtlCol="0" anchor="ctr"/>
+          <a:lstStyle/>
+          <a:p>
+            <a:pPr algn="ctr"/>
+            <a:endParaRPr lang="ko-KR" altLang="en-US"/>
+          </a:p>
+        </p:txBody>
+      </p:sp>
+    </p:spTree>
+    <p:extLst>
+      <p:ext uri="{BB962C8B-B14F-4D97-AF65-F5344CB8AC3E}">
+        <p14:creationId xmlns:p14="http://schemas.microsoft.com/office/powerpoint/2010/main" val="185872510"/>
+      </p:ext>
+    </p:extLst>
+  </p:cSld>
+  <p:clrMapOvr>
+    <a:masterClrMapping/>
+  </p:clrMapOvr>
+</p:sld>
+</file>
+
+<file path=ppt/slides/slide5.xml><?xml version="1.0" encoding="utf-8"?>
+<p:sld xmlns:a="http://schemas.openxmlformats.org/drawingml/2006/main" xmlns:r="http://schemas.openxmlformats.org/officeDocument/2006/relationships" xmlns:p="http://schemas.openxmlformats.org/presentationml/2006/main">
+  <p:cSld>
+    <p:spTree>
+      <p:nvGrpSpPr>
+        <p:cNvPr id="1" name="">
+          <a:extLst>
+            <a:ext uri="{FF2B5EF4-FFF2-40B4-BE49-F238E27FC236}">
+              <a16:creationId xmlns:a16="http://schemas.microsoft.com/office/drawing/2014/main" id="{803C6D72-361A-3D11-283A-8A778E60867A}"/>
+            </a:ext>
+          </a:extLst>
+        </p:cNvPr>
+        <p:cNvGrpSpPr/>
+        <p:nvPr/>
+      </p:nvGrpSpPr>
+      <p:grpSpPr>
+        <a:xfrm>
+          <a:off x="0" y="0"/>
+          <a:ext cx="0" cy="0"/>
+          <a:chOff x="0" y="0"/>
+          <a:chExt cx="0" cy="0"/>
+        </a:xfrm>
+      </p:grpSpPr>
+    </p:spTree>
+    <p:extLst>
+      <p:ext uri="{BB962C8B-B14F-4D97-AF65-F5344CB8AC3E}">
+        <p14:creationId xmlns:p14="http://schemas.microsoft.com/office/powerpoint/2010/main" val="1616084386"/>
+      </p:ext>
+    </p:extLst>
+  </p:cSld>
+  <p:clrMapOvr>
+    <a:masterClrMapping/>
+  </p:clrMapOvr>
+</p:sld>
+</file>
+
+<file path=ppt/slides/slide6.xml><?xml version="1.0" encoding="utf-8"?>
+<p:sld xmlns:a="http://schemas.openxmlformats.org/drawingml/2006/main" xmlns:r="http://schemas.openxmlformats.org/officeDocument/2006/relationships" xmlns:p="http://schemas.openxmlformats.org/presentationml/2006/main">
+  <p:cSld>
+    <p:spTree>
+      <p:nvGrpSpPr>
+        <p:cNvPr id="1" name="">
+          <a:extLst>
+            <a:ext uri="{FF2B5EF4-FFF2-40B4-BE49-F238E27FC236}">
+              <a16:creationId xmlns:a16="http://schemas.microsoft.com/office/drawing/2014/main" id="{6A6CDC7A-7A38-6A1D-83D1-3356E98123EC}"/>
+            </a:ext>
+          </a:extLst>
+        </p:cNvPr>
+        <p:cNvGrpSpPr/>
+        <p:nvPr/>
+      </p:nvGrpSpPr>
+      <p:grpSpPr>
+        <a:xfrm>
+          <a:off x="0" y="0"/>
+          <a:ext cx="0" cy="0"/>
+          <a:chOff x="0" y="0"/>
+          <a:chExt cx="0" cy="0"/>
+        </a:xfrm>
+      </p:grpSpPr>
+    </p:spTree>
+    <p:extLst>
+      <p:ext uri="{BB962C8B-B14F-4D97-AF65-F5344CB8AC3E}">
+        <p14:creationId xmlns:p14="http://schemas.microsoft.com/office/powerpoint/2010/main" val="2223948768"/>
       </p:ext>
     </p:extLst>
   </p:cSld>

</xml_diff>